<commit_message>
feat: enhance PPT report layout, styling, and comment rendering logic
</commit_message>
<xml_diff>
--- a/resources/blank_GE_report.pptx
+++ b/resources/blank_GE_report.pptx
@@ -213,7 +213,7 @@
             <a:fld id="{B0AF433D-ACB8-475A-9DBB-3D1EBDB4B826}" type="datetimeFigureOut">
               <a:rPr lang="ko-KR" altLang="en-US" smtClean="0"/>
               <a:pPr/>
-              <a:t>2025-08-08</a:t>
+              <a:t>2026. 1. 26.</a:t>
             </a:fld>
             <a:endParaRPr lang="ko-KR" altLang="en-US"/>
           </a:p>
@@ -279,38 +279,37 @@
           <a:p>
             <a:pPr lvl="0"/>
             <a:r>
-              <a:rPr lang="ko-KR" altLang="en-US" smtClean="0"/>
+              <a:rPr lang="ko-KR" altLang="en-US"/>
               <a:t>마스터 텍스트 스타일을 편집합니다</a:t>
             </a:r>
           </a:p>
           <a:p>
             <a:pPr lvl="1"/>
             <a:r>
-              <a:rPr lang="ko-KR" altLang="en-US" smtClean="0"/>
+              <a:rPr lang="ko-KR" altLang="en-US"/>
               <a:t>둘째 수준</a:t>
             </a:r>
           </a:p>
           <a:p>
             <a:pPr lvl="2"/>
             <a:r>
-              <a:rPr lang="ko-KR" altLang="en-US" smtClean="0"/>
+              <a:rPr lang="ko-KR" altLang="en-US"/>
               <a:t>셋째 수준</a:t>
             </a:r>
           </a:p>
           <a:p>
             <a:pPr lvl="3"/>
             <a:r>
-              <a:rPr lang="ko-KR" altLang="en-US" smtClean="0"/>
+              <a:rPr lang="ko-KR" altLang="en-US"/>
               <a:t>넷째 수준</a:t>
             </a:r>
           </a:p>
           <a:p>
             <a:pPr lvl="4"/>
             <a:r>
-              <a:rPr lang="ko-KR" altLang="en-US" smtClean="0"/>
+              <a:rPr lang="ko-KR" altLang="en-US"/>
               <a:t>다섯째 수준</a:t>
             </a:r>
-            <a:endParaRPr lang="ko-KR" altLang="en-US"/>
           </a:p>
         </p:txBody>
       </p:sp>
@@ -607,10 +606,9 @@
           <a:lstStyle/>
           <a:p>
             <a:r>
-              <a:rPr lang="ko-KR" altLang="en-US" smtClean="0"/>
+              <a:rPr lang="ko-KR" altLang="en-US"/>
               <a:t>마스터 제목 스타일 편집</a:t>
             </a:r>
-            <a:endParaRPr lang="ko-KR" altLang="en-US"/>
           </a:p>
         </p:txBody>
       </p:sp>
@@ -726,10 +724,9 @@
           </a:lstStyle>
           <a:p>
             <a:r>
-              <a:rPr lang="ko-KR" altLang="en-US" smtClean="0"/>
+              <a:rPr lang="ko-KR" altLang="en-US"/>
               <a:t>마스터 부제목 스타일 편집</a:t>
             </a:r>
-            <a:endParaRPr lang="ko-KR" altLang="en-US"/>
           </a:p>
         </p:txBody>
       </p:sp>
@@ -751,7 +748,7 @@
             <a:fld id="{6DD992CD-CDBB-40CF-A1EE-0B1B8B43A805}" type="datetimeFigureOut">
               <a:rPr lang="ko-KR" altLang="en-US" smtClean="0"/>
               <a:pPr/>
-              <a:t>2025-08-08</a:t>
+              <a:t>2026. 1. 26.</a:t>
             </a:fld>
             <a:endParaRPr lang="ko-KR" altLang="en-US"/>
           </a:p>
@@ -841,10 +838,9 @@
           <a:lstStyle/>
           <a:p>
             <a:r>
-              <a:rPr lang="ko-KR" altLang="en-US" smtClean="0"/>
+              <a:rPr lang="ko-KR" altLang="en-US"/>
               <a:t>마스터 제목 스타일 편집</a:t>
             </a:r>
-            <a:endParaRPr lang="ko-KR" altLang="en-US"/>
           </a:p>
         </p:txBody>
       </p:sp>
@@ -865,38 +861,37 @@
           <a:p>
             <a:pPr lvl="0"/>
             <a:r>
-              <a:rPr lang="ko-KR" altLang="en-US" smtClean="0"/>
+              <a:rPr lang="ko-KR" altLang="en-US"/>
               <a:t>마스터 텍스트 스타일을 편집합니다</a:t>
             </a:r>
           </a:p>
           <a:p>
             <a:pPr lvl="1"/>
             <a:r>
-              <a:rPr lang="ko-KR" altLang="en-US" smtClean="0"/>
+              <a:rPr lang="ko-KR" altLang="en-US"/>
               <a:t>둘째 수준</a:t>
             </a:r>
           </a:p>
           <a:p>
             <a:pPr lvl="2"/>
             <a:r>
-              <a:rPr lang="ko-KR" altLang="en-US" smtClean="0"/>
+              <a:rPr lang="ko-KR" altLang="en-US"/>
               <a:t>셋째 수준</a:t>
             </a:r>
           </a:p>
           <a:p>
             <a:pPr lvl="3"/>
             <a:r>
-              <a:rPr lang="ko-KR" altLang="en-US" smtClean="0"/>
+              <a:rPr lang="ko-KR" altLang="en-US"/>
               <a:t>넷째 수준</a:t>
             </a:r>
           </a:p>
           <a:p>
             <a:pPr lvl="4"/>
             <a:r>
-              <a:rPr lang="ko-KR" altLang="en-US" smtClean="0"/>
+              <a:rPr lang="ko-KR" altLang="en-US"/>
               <a:t>다섯째 수준</a:t>
             </a:r>
-            <a:endParaRPr lang="ko-KR" altLang="en-US"/>
           </a:p>
         </p:txBody>
       </p:sp>
@@ -918,7 +913,7 @@
             <a:fld id="{6DD992CD-CDBB-40CF-A1EE-0B1B8B43A805}" type="datetimeFigureOut">
               <a:rPr lang="ko-KR" altLang="en-US" smtClean="0"/>
               <a:pPr/>
-              <a:t>2025-08-08</a:t>
+              <a:t>2026. 1. 26.</a:t>
             </a:fld>
             <a:endParaRPr lang="ko-KR" altLang="en-US"/>
           </a:p>
@@ -1013,10 +1008,9 @@
           <a:lstStyle/>
           <a:p>
             <a:r>
-              <a:rPr lang="ko-KR" altLang="en-US" smtClean="0"/>
+              <a:rPr lang="ko-KR" altLang="en-US"/>
               <a:t>마스터 제목 스타일 편집</a:t>
             </a:r>
-            <a:endParaRPr lang="ko-KR" altLang="en-US"/>
           </a:p>
         </p:txBody>
       </p:sp>
@@ -1042,38 +1036,37 @@
           <a:p>
             <a:pPr lvl="0"/>
             <a:r>
-              <a:rPr lang="ko-KR" altLang="en-US" smtClean="0"/>
+              <a:rPr lang="ko-KR" altLang="en-US"/>
               <a:t>마스터 텍스트 스타일을 편집합니다</a:t>
             </a:r>
           </a:p>
           <a:p>
             <a:pPr lvl="1"/>
             <a:r>
-              <a:rPr lang="ko-KR" altLang="en-US" smtClean="0"/>
+              <a:rPr lang="ko-KR" altLang="en-US"/>
               <a:t>둘째 수준</a:t>
             </a:r>
           </a:p>
           <a:p>
             <a:pPr lvl="2"/>
             <a:r>
-              <a:rPr lang="ko-KR" altLang="en-US" smtClean="0"/>
+              <a:rPr lang="ko-KR" altLang="en-US"/>
               <a:t>셋째 수준</a:t>
             </a:r>
           </a:p>
           <a:p>
             <a:pPr lvl="3"/>
             <a:r>
-              <a:rPr lang="ko-KR" altLang="en-US" smtClean="0"/>
+              <a:rPr lang="ko-KR" altLang="en-US"/>
               <a:t>넷째 수준</a:t>
             </a:r>
           </a:p>
           <a:p>
             <a:pPr lvl="4"/>
             <a:r>
-              <a:rPr lang="ko-KR" altLang="en-US" smtClean="0"/>
+              <a:rPr lang="ko-KR" altLang="en-US"/>
               <a:t>다섯째 수준</a:t>
             </a:r>
-            <a:endParaRPr lang="ko-KR" altLang="en-US"/>
           </a:p>
         </p:txBody>
       </p:sp>
@@ -1095,7 +1088,7 @@
             <a:fld id="{6DD992CD-CDBB-40CF-A1EE-0B1B8B43A805}" type="datetimeFigureOut">
               <a:rPr lang="ko-KR" altLang="en-US" smtClean="0"/>
               <a:pPr/>
-              <a:t>2025-08-08</a:t>
+              <a:t>2026. 1. 26.</a:t>
             </a:fld>
             <a:endParaRPr lang="ko-KR" altLang="en-US"/>
           </a:p>
@@ -1185,10 +1178,9 @@
           <a:lstStyle/>
           <a:p>
             <a:r>
-              <a:rPr lang="ko-KR" altLang="en-US" smtClean="0"/>
+              <a:rPr lang="ko-KR" altLang="en-US"/>
               <a:t>마스터 제목 스타일 편집</a:t>
             </a:r>
-            <a:endParaRPr lang="ko-KR" altLang="en-US"/>
           </a:p>
         </p:txBody>
       </p:sp>
@@ -1209,38 +1201,37 @@
           <a:p>
             <a:pPr lvl="0"/>
             <a:r>
-              <a:rPr lang="ko-KR" altLang="en-US" smtClean="0"/>
+              <a:rPr lang="ko-KR" altLang="en-US"/>
               <a:t>마스터 텍스트 스타일을 편집합니다</a:t>
             </a:r>
           </a:p>
           <a:p>
             <a:pPr lvl="1"/>
             <a:r>
-              <a:rPr lang="ko-KR" altLang="en-US" smtClean="0"/>
+              <a:rPr lang="ko-KR" altLang="en-US"/>
               <a:t>둘째 수준</a:t>
             </a:r>
           </a:p>
           <a:p>
             <a:pPr lvl="2"/>
             <a:r>
-              <a:rPr lang="ko-KR" altLang="en-US" smtClean="0"/>
+              <a:rPr lang="ko-KR" altLang="en-US"/>
               <a:t>셋째 수준</a:t>
             </a:r>
           </a:p>
           <a:p>
             <a:pPr lvl="3"/>
             <a:r>
-              <a:rPr lang="ko-KR" altLang="en-US" smtClean="0"/>
+              <a:rPr lang="ko-KR" altLang="en-US"/>
               <a:t>넷째 수준</a:t>
             </a:r>
           </a:p>
           <a:p>
             <a:pPr lvl="4"/>
             <a:r>
-              <a:rPr lang="ko-KR" altLang="en-US" smtClean="0"/>
+              <a:rPr lang="ko-KR" altLang="en-US"/>
               <a:t>다섯째 수준</a:t>
             </a:r>
-            <a:endParaRPr lang="ko-KR" altLang="en-US"/>
           </a:p>
         </p:txBody>
       </p:sp>
@@ -1262,7 +1253,7 @@
             <a:fld id="{6DD992CD-CDBB-40CF-A1EE-0B1B8B43A805}" type="datetimeFigureOut">
               <a:rPr lang="ko-KR" altLang="en-US" smtClean="0"/>
               <a:pPr/>
-              <a:t>2025-08-08</a:t>
+              <a:t>2026. 1. 26.</a:t>
             </a:fld>
             <a:endParaRPr lang="ko-KR" altLang="en-US"/>
           </a:p>
@@ -1361,10 +1352,9 @@
           </a:lstStyle>
           <a:p>
             <a:r>
-              <a:rPr lang="ko-KR" altLang="en-US" smtClean="0"/>
+              <a:rPr lang="ko-KR" altLang="en-US"/>
               <a:t>마스터 제목 스타일 편집</a:t>
             </a:r>
-            <a:endParaRPr lang="ko-KR" altLang="en-US"/>
           </a:p>
         </p:txBody>
       </p:sp>
@@ -1481,7 +1471,7 @@
           <a:p>
             <a:pPr lvl="0"/>
             <a:r>
-              <a:rPr lang="ko-KR" altLang="en-US" smtClean="0"/>
+              <a:rPr lang="ko-KR" altLang="en-US"/>
               <a:t>마스터 텍스트 스타일을 편집합니다</a:t>
             </a:r>
           </a:p>
@@ -1505,7 +1495,7 @@
             <a:fld id="{6DD992CD-CDBB-40CF-A1EE-0B1B8B43A805}" type="datetimeFigureOut">
               <a:rPr lang="ko-KR" altLang="en-US" smtClean="0"/>
               <a:pPr/>
-              <a:t>2025-08-08</a:t>
+              <a:t>2026. 1. 26.</a:t>
             </a:fld>
             <a:endParaRPr lang="ko-KR" altLang="en-US"/>
           </a:p>
@@ -1595,10 +1585,9 @@
           <a:lstStyle/>
           <a:p>
             <a:r>
-              <a:rPr lang="ko-KR" altLang="en-US" smtClean="0"/>
+              <a:rPr lang="ko-KR" altLang="en-US"/>
               <a:t>마스터 제목 스타일 편집</a:t>
             </a:r>
-            <a:endParaRPr lang="ko-KR" altLang="en-US"/>
           </a:p>
         </p:txBody>
       </p:sp>
@@ -1652,38 +1641,37 @@
           <a:p>
             <a:pPr lvl="0"/>
             <a:r>
-              <a:rPr lang="ko-KR" altLang="en-US" smtClean="0"/>
+              <a:rPr lang="ko-KR" altLang="en-US"/>
               <a:t>마스터 텍스트 스타일을 편집합니다</a:t>
             </a:r>
           </a:p>
           <a:p>
             <a:pPr lvl="1"/>
             <a:r>
-              <a:rPr lang="ko-KR" altLang="en-US" smtClean="0"/>
+              <a:rPr lang="ko-KR" altLang="en-US"/>
               <a:t>둘째 수준</a:t>
             </a:r>
           </a:p>
           <a:p>
             <a:pPr lvl="2"/>
             <a:r>
-              <a:rPr lang="ko-KR" altLang="en-US" smtClean="0"/>
+              <a:rPr lang="ko-KR" altLang="en-US"/>
               <a:t>셋째 수준</a:t>
             </a:r>
           </a:p>
           <a:p>
             <a:pPr lvl="3"/>
             <a:r>
-              <a:rPr lang="ko-KR" altLang="en-US" smtClean="0"/>
+              <a:rPr lang="ko-KR" altLang="en-US"/>
               <a:t>넷째 수준</a:t>
             </a:r>
           </a:p>
           <a:p>
             <a:pPr lvl="4"/>
             <a:r>
-              <a:rPr lang="ko-KR" altLang="en-US" smtClean="0"/>
+              <a:rPr lang="ko-KR" altLang="en-US"/>
               <a:t>다섯째 수준</a:t>
             </a:r>
-            <a:endParaRPr lang="ko-KR" altLang="en-US"/>
           </a:p>
         </p:txBody>
       </p:sp>
@@ -1737,38 +1725,37 @@
           <a:p>
             <a:pPr lvl="0"/>
             <a:r>
-              <a:rPr lang="ko-KR" altLang="en-US" smtClean="0"/>
+              <a:rPr lang="ko-KR" altLang="en-US"/>
               <a:t>마스터 텍스트 스타일을 편집합니다</a:t>
             </a:r>
           </a:p>
           <a:p>
             <a:pPr lvl="1"/>
             <a:r>
-              <a:rPr lang="ko-KR" altLang="en-US" smtClean="0"/>
+              <a:rPr lang="ko-KR" altLang="en-US"/>
               <a:t>둘째 수준</a:t>
             </a:r>
           </a:p>
           <a:p>
             <a:pPr lvl="2"/>
             <a:r>
-              <a:rPr lang="ko-KR" altLang="en-US" smtClean="0"/>
+              <a:rPr lang="ko-KR" altLang="en-US"/>
               <a:t>셋째 수준</a:t>
             </a:r>
           </a:p>
           <a:p>
             <a:pPr lvl="3"/>
             <a:r>
-              <a:rPr lang="ko-KR" altLang="en-US" smtClean="0"/>
+              <a:rPr lang="ko-KR" altLang="en-US"/>
               <a:t>넷째 수준</a:t>
             </a:r>
           </a:p>
           <a:p>
             <a:pPr lvl="4"/>
             <a:r>
-              <a:rPr lang="ko-KR" altLang="en-US" smtClean="0"/>
+              <a:rPr lang="ko-KR" altLang="en-US"/>
               <a:t>다섯째 수준</a:t>
             </a:r>
-            <a:endParaRPr lang="ko-KR" altLang="en-US"/>
           </a:p>
         </p:txBody>
       </p:sp>
@@ -1790,7 +1777,7 @@
             <a:fld id="{6DD992CD-CDBB-40CF-A1EE-0B1B8B43A805}" type="datetimeFigureOut">
               <a:rPr lang="ko-KR" altLang="en-US" smtClean="0"/>
               <a:pPr/>
-              <a:t>2025-08-08</a:t>
+              <a:t>2026. 1. 26.</a:t>
             </a:fld>
             <a:endParaRPr lang="ko-KR" altLang="en-US"/>
           </a:p>
@@ -1889,10 +1876,9 @@
           </a:lstStyle>
           <a:p>
             <a:r>
-              <a:rPr lang="ko-KR" altLang="en-US" smtClean="0"/>
+              <a:rPr lang="ko-KR" altLang="en-US"/>
               <a:t>마스터 제목 스타일 편집</a:t>
             </a:r>
-            <a:endParaRPr lang="ko-KR" altLang="en-US"/>
           </a:p>
         </p:txBody>
       </p:sp>
@@ -1955,7 +1941,7 @@
           <a:p>
             <a:pPr lvl="0"/>
             <a:r>
-              <a:rPr lang="ko-KR" altLang="en-US" smtClean="0"/>
+              <a:rPr lang="ko-KR" altLang="en-US"/>
               <a:t>마스터 텍스트 스타일을 편집합니다</a:t>
             </a:r>
           </a:p>
@@ -2011,38 +1997,37 @@
           <a:p>
             <a:pPr lvl="0"/>
             <a:r>
-              <a:rPr lang="ko-KR" altLang="en-US" smtClean="0"/>
+              <a:rPr lang="ko-KR" altLang="en-US"/>
               <a:t>마스터 텍스트 스타일을 편집합니다</a:t>
             </a:r>
           </a:p>
           <a:p>
             <a:pPr lvl="1"/>
             <a:r>
-              <a:rPr lang="ko-KR" altLang="en-US" smtClean="0"/>
+              <a:rPr lang="ko-KR" altLang="en-US"/>
               <a:t>둘째 수준</a:t>
             </a:r>
           </a:p>
           <a:p>
             <a:pPr lvl="2"/>
             <a:r>
-              <a:rPr lang="ko-KR" altLang="en-US" smtClean="0"/>
+              <a:rPr lang="ko-KR" altLang="en-US"/>
               <a:t>셋째 수준</a:t>
             </a:r>
           </a:p>
           <a:p>
             <a:pPr lvl="3"/>
             <a:r>
-              <a:rPr lang="ko-KR" altLang="en-US" smtClean="0"/>
+              <a:rPr lang="ko-KR" altLang="en-US"/>
               <a:t>넷째 수준</a:t>
             </a:r>
           </a:p>
           <a:p>
             <a:pPr lvl="4"/>
             <a:r>
-              <a:rPr lang="ko-KR" altLang="en-US" smtClean="0"/>
+              <a:rPr lang="ko-KR" altLang="en-US"/>
               <a:t>다섯째 수준</a:t>
             </a:r>
-            <a:endParaRPr lang="ko-KR" altLang="en-US"/>
           </a:p>
         </p:txBody>
       </p:sp>
@@ -2105,7 +2090,7 @@
           <a:p>
             <a:pPr lvl="0"/>
             <a:r>
-              <a:rPr lang="ko-KR" altLang="en-US" smtClean="0"/>
+              <a:rPr lang="ko-KR" altLang="en-US"/>
               <a:t>마스터 텍스트 스타일을 편집합니다</a:t>
             </a:r>
           </a:p>
@@ -2161,38 +2146,37 @@
           <a:p>
             <a:pPr lvl="0"/>
             <a:r>
-              <a:rPr lang="ko-KR" altLang="en-US" smtClean="0"/>
+              <a:rPr lang="ko-KR" altLang="en-US"/>
               <a:t>마스터 텍스트 스타일을 편집합니다</a:t>
             </a:r>
           </a:p>
           <a:p>
             <a:pPr lvl="1"/>
             <a:r>
-              <a:rPr lang="ko-KR" altLang="en-US" smtClean="0"/>
+              <a:rPr lang="ko-KR" altLang="en-US"/>
               <a:t>둘째 수준</a:t>
             </a:r>
           </a:p>
           <a:p>
             <a:pPr lvl="2"/>
             <a:r>
-              <a:rPr lang="ko-KR" altLang="en-US" smtClean="0"/>
+              <a:rPr lang="ko-KR" altLang="en-US"/>
               <a:t>셋째 수준</a:t>
             </a:r>
           </a:p>
           <a:p>
             <a:pPr lvl="3"/>
             <a:r>
-              <a:rPr lang="ko-KR" altLang="en-US" smtClean="0"/>
+              <a:rPr lang="ko-KR" altLang="en-US"/>
               <a:t>넷째 수준</a:t>
             </a:r>
           </a:p>
           <a:p>
             <a:pPr lvl="4"/>
             <a:r>
-              <a:rPr lang="ko-KR" altLang="en-US" smtClean="0"/>
+              <a:rPr lang="ko-KR" altLang="en-US"/>
               <a:t>다섯째 수준</a:t>
             </a:r>
-            <a:endParaRPr lang="ko-KR" altLang="en-US"/>
           </a:p>
         </p:txBody>
       </p:sp>
@@ -2214,7 +2198,7 @@
             <a:fld id="{6DD992CD-CDBB-40CF-A1EE-0B1B8B43A805}" type="datetimeFigureOut">
               <a:rPr lang="ko-KR" altLang="en-US" smtClean="0"/>
               <a:pPr/>
-              <a:t>2025-08-08</a:t>
+              <a:t>2026. 1. 26.</a:t>
             </a:fld>
             <a:endParaRPr lang="ko-KR" altLang="en-US"/>
           </a:p>
@@ -2304,10 +2288,9 @@
           <a:lstStyle/>
           <a:p>
             <a:r>
-              <a:rPr lang="ko-KR" altLang="en-US" smtClean="0"/>
+              <a:rPr lang="ko-KR" altLang="en-US"/>
               <a:t>마스터 제목 스타일 편집</a:t>
             </a:r>
-            <a:endParaRPr lang="ko-KR" altLang="en-US"/>
           </a:p>
         </p:txBody>
       </p:sp>
@@ -2329,7 +2312,7 @@
             <a:fld id="{6DD992CD-CDBB-40CF-A1EE-0B1B8B43A805}" type="datetimeFigureOut">
               <a:rPr lang="ko-KR" altLang="en-US" smtClean="0"/>
               <a:pPr/>
-              <a:t>2025-08-08</a:t>
+              <a:t>2026. 1. 26.</a:t>
             </a:fld>
             <a:endParaRPr lang="ko-KR" altLang="en-US"/>
           </a:p>
@@ -2421,7 +2404,7 @@
             <a:fld id="{6DD992CD-CDBB-40CF-A1EE-0B1B8B43A805}" type="datetimeFigureOut">
               <a:rPr lang="ko-KR" altLang="en-US" smtClean="0"/>
               <a:pPr/>
-              <a:t>2025-08-08</a:t>
+              <a:t>2026. 1. 26.</a:t>
             </a:fld>
             <a:endParaRPr lang="ko-KR" altLang="en-US"/>
           </a:p>
@@ -2520,10 +2503,9 @@
           </a:lstStyle>
           <a:p>
             <a:r>
-              <a:rPr lang="ko-KR" altLang="en-US" smtClean="0"/>
+              <a:rPr lang="ko-KR" altLang="en-US"/>
               <a:t>마스터 제목 스타일 편집</a:t>
             </a:r>
-            <a:endParaRPr lang="ko-KR" altLang="en-US"/>
           </a:p>
         </p:txBody>
       </p:sp>
@@ -2577,38 +2559,37 @@
           <a:p>
             <a:pPr lvl="0"/>
             <a:r>
-              <a:rPr lang="ko-KR" altLang="en-US" smtClean="0"/>
+              <a:rPr lang="ko-KR" altLang="en-US"/>
               <a:t>마스터 텍스트 스타일을 편집합니다</a:t>
             </a:r>
           </a:p>
           <a:p>
             <a:pPr lvl="1"/>
             <a:r>
-              <a:rPr lang="ko-KR" altLang="en-US" smtClean="0"/>
+              <a:rPr lang="ko-KR" altLang="en-US"/>
               <a:t>둘째 수준</a:t>
             </a:r>
           </a:p>
           <a:p>
             <a:pPr lvl="2"/>
             <a:r>
-              <a:rPr lang="ko-KR" altLang="en-US" smtClean="0"/>
+              <a:rPr lang="ko-KR" altLang="en-US"/>
               <a:t>셋째 수준</a:t>
             </a:r>
           </a:p>
           <a:p>
             <a:pPr lvl="3"/>
             <a:r>
-              <a:rPr lang="ko-KR" altLang="en-US" smtClean="0"/>
+              <a:rPr lang="ko-KR" altLang="en-US"/>
               <a:t>넷째 수준</a:t>
             </a:r>
           </a:p>
           <a:p>
             <a:pPr lvl="4"/>
             <a:r>
-              <a:rPr lang="ko-KR" altLang="en-US" smtClean="0"/>
+              <a:rPr lang="ko-KR" altLang="en-US"/>
               <a:t>다섯째 수준</a:t>
             </a:r>
-            <a:endParaRPr lang="ko-KR" altLang="en-US"/>
           </a:p>
         </p:txBody>
       </p:sp>
@@ -2671,7 +2652,7 @@
           <a:p>
             <a:pPr lvl="0"/>
             <a:r>
-              <a:rPr lang="ko-KR" altLang="en-US" smtClean="0"/>
+              <a:rPr lang="ko-KR" altLang="en-US"/>
               <a:t>마스터 텍스트 스타일을 편집합니다</a:t>
             </a:r>
           </a:p>
@@ -2695,7 +2676,7 @@
             <a:fld id="{6DD992CD-CDBB-40CF-A1EE-0B1B8B43A805}" type="datetimeFigureOut">
               <a:rPr lang="ko-KR" altLang="en-US" smtClean="0"/>
               <a:pPr/>
-              <a:t>2025-08-08</a:t>
+              <a:t>2026. 1. 26.</a:t>
             </a:fld>
             <a:endParaRPr lang="ko-KR" altLang="en-US"/>
           </a:p>
@@ -2794,10 +2775,9 @@
           </a:lstStyle>
           <a:p>
             <a:r>
-              <a:rPr lang="ko-KR" altLang="en-US" smtClean="0"/>
+              <a:rPr lang="ko-KR" altLang="en-US"/>
               <a:t>마스터 제목 스타일 편집</a:t>
             </a:r>
-            <a:endParaRPr lang="ko-KR" altLang="en-US"/>
           </a:p>
         </p:txBody>
       </p:sp>
@@ -2921,7 +2901,7 @@
           <a:p>
             <a:pPr lvl="0"/>
             <a:r>
-              <a:rPr lang="ko-KR" altLang="en-US" smtClean="0"/>
+              <a:rPr lang="ko-KR" altLang="en-US"/>
               <a:t>마스터 텍스트 스타일을 편집합니다</a:t>
             </a:r>
           </a:p>
@@ -2945,7 +2925,7 @@
             <a:fld id="{6DD992CD-CDBB-40CF-A1EE-0B1B8B43A805}" type="datetimeFigureOut">
               <a:rPr lang="ko-KR" altLang="en-US" smtClean="0"/>
               <a:pPr/>
-              <a:t>2025-08-08</a:t>
+              <a:t>2026. 1. 26.</a:t>
             </a:fld>
             <a:endParaRPr lang="ko-KR" altLang="en-US"/>
           </a:p>
@@ -3050,10 +3030,9 @@
           <a:lstStyle/>
           <a:p>
             <a:r>
-              <a:rPr lang="ko-KR" altLang="en-US" smtClean="0"/>
+              <a:rPr lang="ko-KR" altLang="en-US"/>
               <a:t>마스터 제목 스타일 편집</a:t>
             </a:r>
-            <a:endParaRPr lang="ko-KR" altLang="en-US"/>
           </a:p>
         </p:txBody>
       </p:sp>
@@ -3084,38 +3063,37 @@
           <a:p>
             <a:pPr lvl="0"/>
             <a:r>
-              <a:rPr lang="ko-KR" altLang="en-US" smtClean="0"/>
+              <a:rPr lang="ko-KR" altLang="en-US"/>
               <a:t>마스터 텍스트 스타일을 편집합니다</a:t>
             </a:r>
           </a:p>
           <a:p>
             <a:pPr lvl="1"/>
             <a:r>
-              <a:rPr lang="ko-KR" altLang="en-US" smtClean="0"/>
+              <a:rPr lang="ko-KR" altLang="en-US"/>
               <a:t>둘째 수준</a:t>
             </a:r>
           </a:p>
           <a:p>
             <a:pPr lvl="2"/>
             <a:r>
-              <a:rPr lang="ko-KR" altLang="en-US" smtClean="0"/>
+              <a:rPr lang="ko-KR" altLang="en-US"/>
               <a:t>셋째 수준</a:t>
             </a:r>
           </a:p>
           <a:p>
             <a:pPr lvl="3"/>
             <a:r>
-              <a:rPr lang="ko-KR" altLang="en-US" smtClean="0"/>
+              <a:rPr lang="ko-KR" altLang="en-US"/>
               <a:t>넷째 수준</a:t>
             </a:r>
           </a:p>
           <a:p>
             <a:pPr lvl="4"/>
             <a:r>
-              <a:rPr lang="ko-KR" altLang="en-US" smtClean="0"/>
+              <a:rPr lang="ko-KR" altLang="en-US"/>
               <a:t>다섯째 수준</a:t>
             </a:r>
-            <a:endParaRPr lang="ko-KR" altLang="en-US"/>
           </a:p>
         </p:txBody>
       </p:sp>
@@ -3155,7 +3133,7 @@
             <a:fld id="{6DD992CD-CDBB-40CF-A1EE-0B1B8B43A805}" type="datetimeFigureOut">
               <a:rPr lang="ko-KR" altLang="en-US" smtClean="0"/>
               <a:pPr/>
-              <a:t>2025-08-08</a:t>
+              <a:t>2026. 1. 26.</a:t>
             </a:fld>
             <a:endParaRPr lang="ko-KR" altLang="en-US"/>
           </a:p>
@@ -3548,15 +3526,15 @@
           <a:lstStyle/>
           <a:p>
             <a:r>
-              <a:rPr lang="en-US" altLang="ko-KR" sz="1200" b="1" dirty="0" smtClean="0"/>
+              <a:rPr lang="en-US" altLang="ko-KR" sz="1200" b="1" dirty="0"/>
               <a:t>▣ </a:t>
             </a:r>
             <a:r>
-              <a:rPr lang="ko-KR" altLang="en-US" sz="1200" b="1" dirty="0" err="1" smtClean="0"/>
+              <a:rPr lang="ko-KR" altLang="en-US" sz="1200" b="1" dirty="0" err="1"/>
               <a:t>검체</a:t>
             </a:r>
             <a:r>
-              <a:rPr lang="ko-KR" altLang="en-US" sz="1200" b="1" dirty="0" smtClean="0"/>
+              <a:rPr lang="ko-KR" altLang="en-US" sz="1200" b="1" dirty="0"/>
               <a:t> 정보</a:t>
             </a:r>
             <a:endParaRPr lang="ko-KR" altLang="en-US" sz="1200" dirty="0"/>
@@ -3633,7 +3611,7 @@
           <a:p>
             <a:pPr algn="ctr"/>
             <a:r>
-              <a:rPr lang="en-US" altLang="ko-KR" sz="2200" b="1" dirty="0" smtClean="0">
+              <a:rPr lang="en-US" altLang="ko-KR" sz="2200" b="1" dirty="0">
                 <a:latin typeface="+mn-ea"/>
               </a:rPr>
               <a:t>NGS Panel Level II Analysis Report</a:t>
@@ -3666,14 +3644,13 @@
           <a:lstStyle/>
           <a:p>
             <a:r>
-              <a:rPr lang="en-US" altLang="ko-KR" sz="1200" b="1" dirty="0" smtClean="0"/>
+              <a:rPr lang="en-US" altLang="ko-KR" sz="1200" b="1" dirty="0"/>
               <a:t>▣ </a:t>
             </a:r>
             <a:r>
-              <a:rPr lang="ko-KR" altLang="en-US" sz="1200" b="1" dirty="0" smtClean="0"/>
+              <a:rPr lang="ko-KR" altLang="en-US" sz="1200" b="1" dirty="0"/>
               <a:t>검사결과 </a:t>
             </a:r>
-            <a:endParaRPr lang="ko-KR" altLang="en-US" sz="1200" b="1" dirty="0"/>
           </a:p>
         </p:txBody>
       </p:sp>
@@ -3699,11 +3676,11 @@
           <a:lstStyle/>
           <a:p>
             <a:r>
-              <a:rPr lang="en-US" altLang="ko-KR" sz="1200" b="1" dirty="0" smtClean="0"/>
+              <a:rPr lang="en-US" altLang="ko-KR" sz="1200" b="1" dirty="0"/>
               <a:t>1. </a:t>
             </a:r>
             <a:r>
-              <a:rPr lang="en-US" altLang="ko-KR" sz="1200" b="1" dirty="0" smtClean="0">
+              <a:rPr lang="en-US" altLang="ko-KR" sz="1200" b="1" dirty="0">
                 <a:solidFill>
                   <a:srgbClr val="FF0000"/>
                 </a:solidFill>
@@ -3773,7 +3750,7 @@
           <a:lstStyle/>
           <a:p>
             <a:r>
-              <a:rPr lang="en-US" altLang="ko-KR" dirty="0" smtClean="0"/>
+              <a:rPr lang="en-US" altLang="ko-KR" dirty="0"/>
               <a:t>--------------------------------------------------------------------</a:t>
             </a:r>
             <a:endParaRPr lang="ko-KR" altLang="en-US" dirty="0"/>
@@ -3803,15 +3780,11 @@
           <a:lstStyle/>
           <a:p>
             <a:r>
-              <a:rPr lang="en-US" altLang="ko-KR" sz="1200" b="1" dirty="0" smtClean="0"/>
-              <a:t>- SNVs </a:t>
+              <a:rPr lang="en-US" altLang="ko-KR" sz="1200" b="1" dirty="0"/>
+              <a:t>- SNVs &amp; </a:t>
             </a:r>
             <a:r>
-              <a:rPr lang="en-US" altLang="ko-KR" sz="1200" b="1" dirty="0"/>
-              <a:t>&amp; </a:t>
-            </a:r>
-            <a:r>
-              <a:rPr lang="en-US" altLang="ko-KR" sz="1200" b="1" dirty="0" err="1" smtClean="0"/>
+              <a:rPr lang="en-US" altLang="ko-KR" sz="1200" b="1" dirty="0" err="1"/>
               <a:t>Indels</a:t>
             </a:r>
             <a:endParaRPr lang="ko-KR" altLang="en-US" sz="1200" b="1" dirty="0"/>
@@ -3935,53 +3908,53 @@
           </a:lstStyle>
           <a:p>
             <a:r>
-              <a:rPr lang="ko-KR" altLang="en-US" sz="800" dirty="0" smtClean="0"/>
+              <a:rPr lang="ko-KR" altLang="en-US" sz="800" dirty="0"/>
               <a:t>검사기관 </a:t>
             </a:r>
             <a:r>
-              <a:rPr lang="en-US" altLang="ko-KR" sz="800" dirty="0" smtClean="0"/>
+              <a:rPr lang="en-US" altLang="ko-KR" sz="800" dirty="0"/>
               <a:t>: </a:t>
             </a:r>
             <a:r>
-              <a:rPr lang="ko-KR" altLang="en-US" sz="800" dirty="0" err="1" smtClean="0"/>
+              <a:rPr lang="ko-KR" altLang="en-US" sz="800" dirty="0" err="1"/>
               <a:t>세브란스병원</a:t>
             </a:r>
             <a:r>
-              <a:rPr lang="ko-KR" altLang="en-US" sz="800" dirty="0" smtClean="0"/>
+              <a:rPr lang="ko-KR" altLang="en-US" sz="800" dirty="0"/>
               <a:t> 병리과 분자병리 검사실</a:t>
             </a:r>
-            <a:endParaRPr lang="en-US" altLang="ko-KR" sz="800" dirty="0" smtClean="0"/>
+            <a:endParaRPr lang="en-US" altLang="ko-KR" sz="800" dirty="0"/>
           </a:p>
           <a:p>
             <a:r>
-              <a:rPr lang="ko-KR" altLang="en-US" sz="800" dirty="0" smtClean="0"/>
+              <a:rPr lang="ko-KR" altLang="en-US" sz="800" dirty="0"/>
               <a:t>서울시 서대문구 연세로 </a:t>
             </a:r>
             <a:r>
-              <a:rPr lang="en-US" altLang="ko-KR" sz="800" dirty="0" smtClean="0"/>
+              <a:rPr lang="en-US" altLang="ko-KR" sz="800" dirty="0"/>
               <a:t>50-1 (</a:t>
             </a:r>
             <a:r>
-              <a:rPr lang="ko-KR" altLang="en-US" sz="800" dirty="0" smtClean="0"/>
+              <a:rPr lang="ko-KR" altLang="en-US" sz="800" dirty="0"/>
               <a:t>신촌동 </a:t>
             </a:r>
             <a:r>
-              <a:rPr lang="en-US" altLang="ko-KR" sz="800" dirty="0" smtClean="0"/>
+              <a:rPr lang="en-US" altLang="ko-KR" sz="800" dirty="0"/>
               <a:t>134) </a:t>
             </a:r>
             <a:r>
-              <a:rPr lang="ko-KR" altLang="en-US" sz="800" dirty="0" err="1" smtClean="0"/>
+              <a:rPr lang="ko-KR" altLang="en-US" sz="800" dirty="0" err="1"/>
               <a:t>세브란스병원</a:t>
             </a:r>
             <a:r>
-              <a:rPr lang="ko-KR" altLang="en-US" sz="800" dirty="0" smtClean="0"/>
+              <a:rPr lang="ko-KR" altLang="en-US" sz="800" dirty="0"/>
               <a:t> 병리과</a:t>
             </a:r>
-            <a:endParaRPr lang="en-US" altLang="ko-KR" sz="800" dirty="0" smtClean="0"/>
+            <a:endParaRPr lang="en-US" altLang="ko-KR" sz="800" dirty="0"/>
           </a:p>
           <a:p>
             <a:r>
-              <a:rPr lang="en-US" altLang="ko-KR" sz="800" dirty="0" smtClean="0"/>
+              <a:rPr lang="en-US" altLang="ko-KR" sz="800" dirty="0"/>
               <a:t>Tel: 02-2228-2625</a:t>
             </a:r>
             <a:endParaRPr lang="ko-KR" altLang="en-US" sz="800" dirty="0"/>
@@ -3997,14 +3970,14 @@
           <p:nvPr>
             <p:extLst>
               <p:ext uri="{D42A27DB-BD31-4B8C-83A1-F6EECF244321}">
-                <p14:modId xmlns:p14="http://schemas.microsoft.com/office/powerpoint/2010/main" val="4248693740"/>
+                <p14:modId xmlns:p14="http://schemas.microsoft.com/office/powerpoint/2010/main" val="1634125706"/>
               </p:ext>
             </p:extLst>
           </p:nvPr>
         </p:nvGraphicFramePr>
         <p:xfrm>
           <a:off x="332656" y="3232744"/>
-          <a:ext cx="6192689" cy="835200"/>
+          <a:ext cx="6192689" cy="547200"/>
         </p:xfrm>
         <a:graphic>
           <a:graphicData uri="http://schemas.openxmlformats.org/drawingml/2006/table">
@@ -4245,7 +4218,7 @@
                     <a:p>
                       <a:pPr algn="ctr" fontAlgn="ctr"/>
                       <a:r>
-                        <a:rPr lang="en-US" sz="800" b="1" i="0" u="none" strike="noStrike" dirty="0" smtClean="0">
+                        <a:rPr lang="en-US" sz="800" b="1" i="0" u="none" strike="noStrike" dirty="0">
                           <a:solidFill>
                             <a:srgbClr val="000000"/>
                           </a:solidFill>
@@ -4254,6 +4227,67 @@
                           <a:ea typeface="+mn-ea"/>
                         </a:rPr>
                         <a:t>VAF (%)</a:t>
+                      </a:r>
+                    </a:p>
+                  </a:txBody>
+                  <a:tcPr marL="5625" marR="5625" marT="5625" marB="0" anchor="ctr">
+                    <a:lnL w="6350" cap="flat" cmpd="sng" algn="ctr">
+                      <a:solidFill>
+                        <a:srgbClr val="000000"/>
+                      </a:solidFill>
+                      <a:prstDash val="solid"/>
+                      <a:round/>
+                      <a:headEnd type="none" w="med" len="med"/>
+                      <a:tailEnd type="none" w="med" len="med"/>
+                    </a:lnL>
+                    <a:lnR w="6350" cap="flat" cmpd="sng" algn="ctr">
+                      <a:solidFill>
+                        <a:srgbClr val="000000"/>
+                      </a:solidFill>
+                      <a:prstDash val="solid"/>
+                      <a:round/>
+                      <a:headEnd type="none" w="med" len="med"/>
+                      <a:tailEnd type="none" w="med" len="med"/>
+                    </a:lnR>
+                    <a:lnT w="6350" cap="flat" cmpd="sng" algn="ctr">
+                      <a:solidFill>
+                        <a:srgbClr val="000000"/>
+                      </a:solidFill>
+                      <a:prstDash val="solid"/>
+                      <a:round/>
+                      <a:headEnd type="none" w="med" len="med"/>
+                      <a:tailEnd type="none" w="med" len="med"/>
+                    </a:lnT>
+                    <a:lnB w="6350" cap="flat" cmpd="sng" algn="ctr">
+                      <a:solidFill>
+                        <a:srgbClr val="000000"/>
+                      </a:solidFill>
+                      <a:prstDash val="solid"/>
+                      <a:round/>
+                      <a:headEnd type="none" w="med" len="med"/>
+                      <a:tailEnd type="none" w="med" len="med"/>
+                    </a:lnB>
+                    <a:solidFill>
+                      <a:srgbClr val="DCE6F1"/>
+                    </a:solidFill>
+                  </a:tcPr>
+                </a:tc>
+                <a:tc>
+                  <a:txBody>
+                    <a:bodyPr/>
+                    <a:lstStyle/>
+                    <a:p>
+                      <a:pPr algn="ctr" fontAlgn="ctr"/>
+                      <a:r>
+                        <a:rPr lang="en-US" sz="800" b="1" i="0" u="none" strike="noStrike" dirty="0" err="1">
+                          <a:solidFill>
+                            <a:srgbClr val="000000"/>
+                          </a:solidFill>
+                          <a:effectLst/>
+                          <a:latin typeface="+mn-ea"/>
+                          <a:ea typeface="+mn-ea"/>
+                        </a:rPr>
+                        <a:t>HGVSc</a:t>
                       </a:r>
                       <a:endParaRPr lang="en-US" sz="800" b="1" i="0" u="none" strike="noStrike" dirty="0">
                         <a:solidFill>
@@ -4314,7 +4348,7 @@
                     <a:p>
                       <a:pPr algn="ctr" fontAlgn="ctr"/>
                       <a:r>
-                        <a:rPr lang="en-US" sz="800" b="1" i="0" u="none" strike="noStrike" dirty="0" err="1" smtClean="0">
+                        <a:rPr lang="en-US" sz="800" b="1" i="0" u="none" strike="noStrike" dirty="0" err="1">
                           <a:solidFill>
                             <a:srgbClr val="000000"/>
                           </a:solidFill>
@@ -4322,78 +4356,9 @@
                           <a:latin typeface="+mn-ea"/>
                           <a:ea typeface="+mn-ea"/>
                         </a:rPr>
-                        <a:t>HGVSc</a:t>
+                        <a:t>HGVSp</a:t>
                       </a:r>
                       <a:endParaRPr lang="en-US" sz="800" b="1" i="0" u="none" strike="noStrike" dirty="0">
-                        <a:solidFill>
-                          <a:srgbClr val="000000"/>
-                        </a:solidFill>
-                        <a:effectLst/>
-                        <a:latin typeface="+mn-ea"/>
-                        <a:ea typeface="+mn-ea"/>
-                      </a:endParaRPr>
-                    </a:p>
-                  </a:txBody>
-                  <a:tcPr marL="5625" marR="5625" marT="5625" marB="0" anchor="ctr">
-                    <a:lnL w="6350" cap="flat" cmpd="sng" algn="ctr">
-                      <a:solidFill>
-                        <a:srgbClr val="000000"/>
-                      </a:solidFill>
-                      <a:prstDash val="solid"/>
-                      <a:round/>
-                      <a:headEnd type="none" w="med" len="med"/>
-                      <a:tailEnd type="none" w="med" len="med"/>
-                    </a:lnL>
-                    <a:lnR w="6350" cap="flat" cmpd="sng" algn="ctr">
-                      <a:solidFill>
-                        <a:srgbClr val="000000"/>
-                      </a:solidFill>
-                      <a:prstDash val="solid"/>
-                      <a:round/>
-                      <a:headEnd type="none" w="med" len="med"/>
-                      <a:tailEnd type="none" w="med" len="med"/>
-                    </a:lnR>
-                    <a:lnT w="6350" cap="flat" cmpd="sng" algn="ctr">
-                      <a:solidFill>
-                        <a:srgbClr val="000000"/>
-                      </a:solidFill>
-                      <a:prstDash val="solid"/>
-                      <a:round/>
-                      <a:headEnd type="none" w="med" len="med"/>
-                      <a:tailEnd type="none" w="med" len="med"/>
-                    </a:lnT>
-                    <a:lnB w="6350" cap="flat" cmpd="sng" algn="ctr">
-                      <a:solidFill>
-                        <a:srgbClr val="000000"/>
-                      </a:solidFill>
-                      <a:prstDash val="solid"/>
-                      <a:round/>
-                      <a:headEnd type="none" w="med" len="med"/>
-                      <a:tailEnd type="none" w="med" len="med"/>
-                    </a:lnB>
-                    <a:solidFill>
-                      <a:srgbClr val="DCE6F1"/>
-                    </a:solidFill>
-                  </a:tcPr>
-                </a:tc>
-                <a:tc>
-                  <a:txBody>
-                    <a:bodyPr/>
-                    <a:lstStyle/>
-                    <a:p>
-                      <a:pPr algn="ctr" fontAlgn="ctr"/>
-                      <a:r>
-                        <a:rPr lang="en-US" sz="800" b="1" i="0" u="none" strike="noStrike" dirty="0" err="1" smtClean="0">
-                          <a:solidFill>
-                            <a:srgbClr val="000000"/>
-                          </a:solidFill>
-                          <a:effectLst/>
-                          <a:latin typeface="+mn-ea"/>
-                          <a:ea typeface="+mn-ea"/>
-                        </a:rPr>
-                        <a:t>HGVSp</a:t>
-                      </a:r>
-                      <a:endParaRPr lang="en-US" sz="800" b="1" i="0" u="none" strike="noStrike" dirty="0" smtClean="0">
                         <a:solidFill>
                           <a:srgbClr val="000000"/>
                         </a:solidFill>
@@ -4698,7 +4663,7 @@
                         <a:tabLst/>
                         <a:defRPr/>
                       </a:pPr>
-                      <a:endParaRPr lang="en-US" altLang="ko-KR" sz="800" b="1" i="0" u="none" strike="noStrike" kern="1200" dirty="0" smtClean="0">
+                      <a:endParaRPr lang="en-US" altLang="ko-KR" sz="800" b="1" i="0" u="none" strike="noStrike" kern="1200" dirty="0">
                         <a:solidFill>
                           <a:srgbClr val="FF0000"/>
                         </a:solidFill>
@@ -4742,299 +4707,6 @@
                 <a:extLst>
                   <a:ext uri="{0D108BD9-81ED-4DB2-BD59-A6C34878D82A}">
                     <a16:rowId xmlns:a16="http://schemas.microsoft.com/office/drawing/2014/main" val="10001"/>
-                  </a:ext>
-                </a:extLst>
-              </a:tr>
-              <a:tr h="288000">
-                <a:tc>
-                  <a:txBody>
-                    <a:bodyPr/>
-                    <a:lstStyle/>
-                    <a:p>
-                      <a:pPr algn="ctr" fontAlgn="ctr"/>
-                      <a:endParaRPr lang="en-US" sz="800" b="1" i="0" u="none" strike="noStrike" dirty="0">
-                        <a:solidFill>
-                          <a:srgbClr val="FF0000"/>
-                        </a:solidFill>
-                        <a:effectLst/>
-                        <a:latin typeface="+mn-ea"/>
-                        <a:ea typeface="+mn-ea"/>
-                      </a:endParaRPr>
-                    </a:p>
-                  </a:txBody>
-                  <a:tcPr marL="5625" marR="5625" marT="5625" marB="0" anchor="ctr">
-                    <a:lnL>
-                      <a:noFill/>
-                    </a:lnL>
-                    <a:lnR>
-                      <a:noFill/>
-                    </a:lnR>
-                    <a:lnT w="6350" cap="flat" cmpd="sng" algn="ctr">
-                      <a:solidFill>
-                        <a:srgbClr val="000000"/>
-                      </a:solidFill>
-                      <a:prstDash val="solid"/>
-                      <a:round/>
-                      <a:headEnd type="none" w="med" len="med"/>
-                      <a:tailEnd type="none" w="med" len="med"/>
-                    </a:lnT>
-                    <a:lnB w="6350" cap="flat" cmpd="sng" algn="ctr">
-                      <a:solidFill>
-                        <a:srgbClr val="000000"/>
-                      </a:solidFill>
-                      <a:prstDash val="solid"/>
-                      <a:round/>
-                      <a:headEnd type="none" w="med" len="med"/>
-                      <a:tailEnd type="none" w="med" len="med"/>
-                    </a:lnB>
-                    <a:solidFill>
-                      <a:srgbClr val="FFFFFF"/>
-                    </a:solidFill>
-                  </a:tcPr>
-                </a:tc>
-                <a:tc>
-                  <a:txBody>
-                    <a:bodyPr/>
-                    <a:lstStyle/>
-                    <a:p>
-                      <a:pPr algn="ctr" fontAlgn="ctr"/>
-                      <a:endParaRPr lang="en-US" sz="800" b="1" i="0" u="none" strike="noStrike" dirty="0">
-                        <a:solidFill>
-                          <a:srgbClr val="FF0000"/>
-                        </a:solidFill>
-                        <a:effectLst/>
-                        <a:latin typeface="+mn-ea"/>
-                        <a:ea typeface="+mn-ea"/>
-                      </a:endParaRPr>
-                    </a:p>
-                  </a:txBody>
-                  <a:tcPr marL="5625" marR="5625" marT="5625" marB="0" anchor="ctr">
-                    <a:lnL>
-                      <a:noFill/>
-                    </a:lnL>
-                    <a:lnR>
-                      <a:noFill/>
-                    </a:lnR>
-                    <a:lnT w="6350" cap="flat" cmpd="sng" algn="ctr">
-                      <a:solidFill>
-                        <a:srgbClr val="000000"/>
-                      </a:solidFill>
-                      <a:prstDash val="solid"/>
-                      <a:round/>
-                      <a:headEnd type="none" w="med" len="med"/>
-                      <a:tailEnd type="none" w="med" len="med"/>
-                    </a:lnT>
-                    <a:lnB w="6350" cap="flat" cmpd="sng" algn="ctr">
-                      <a:solidFill>
-                        <a:srgbClr val="000000"/>
-                      </a:solidFill>
-                      <a:prstDash val="solid"/>
-                      <a:round/>
-                      <a:headEnd type="none" w="med" len="med"/>
-                      <a:tailEnd type="none" w="med" len="med"/>
-                    </a:lnB>
-                    <a:solidFill>
-                      <a:srgbClr val="FFFFFF"/>
-                    </a:solidFill>
-                  </a:tcPr>
-                </a:tc>
-                <a:tc>
-                  <a:txBody>
-                    <a:bodyPr/>
-                    <a:lstStyle/>
-                    <a:p>
-                      <a:pPr algn="ctr" fontAlgn="ctr"/>
-                      <a:endParaRPr lang="en-US" sz="800" b="1" i="0" u="none" strike="noStrike" dirty="0">
-                        <a:solidFill>
-                          <a:srgbClr val="FF0000"/>
-                        </a:solidFill>
-                        <a:effectLst/>
-                        <a:latin typeface="+mn-ea"/>
-                        <a:ea typeface="+mn-ea"/>
-                      </a:endParaRPr>
-                    </a:p>
-                  </a:txBody>
-                  <a:tcPr marL="5625" marR="5625" marT="5625" marB="0" anchor="ctr">
-                    <a:lnL>
-                      <a:noFill/>
-                    </a:lnL>
-                    <a:lnR>
-                      <a:noFill/>
-                    </a:lnR>
-                    <a:lnT w="6350" cap="flat" cmpd="sng" algn="ctr">
-                      <a:solidFill>
-                        <a:srgbClr val="000000"/>
-                      </a:solidFill>
-                      <a:prstDash val="solid"/>
-                      <a:round/>
-                      <a:headEnd type="none" w="med" len="med"/>
-                      <a:tailEnd type="none" w="med" len="med"/>
-                    </a:lnT>
-                    <a:lnB w="6350" cap="flat" cmpd="sng" algn="ctr">
-                      <a:solidFill>
-                        <a:srgbClr val="000000"/>
-                      </a:solidFill>
-                      <a:prstDash val="solid"/>
-                      <a:round/>
-                      <a:headEnd type="none" w="med" len="med"/>
-                      <a:tailEnd type="none" w="med" len="med"/>
-                    </a:lnB>
-                  </a:tcPr>
-                </a:tc>
-                <a:tc>
-                  <a:txBody>
-                    <a:bodyPr/>
-                    <a:lstStyle/>
-                    <a:p>
-                      <a:pPr algn="ctr" fontAlgn="ctr"/>
-                      <a:endParaRPr lang="en-US" altLang="ko-KR" sz="800" b="1" i="0" u="none" strike="noStrike" dirty="0">
-                        <a:solidFill>
-                          <a:srgbClr val="FF0000"/>
-                        </a:solidFill>
-                        <a:effectLst/>
-                        <a:latin typeface="+mn-ea"/>
-                        <a:ea typeface="+mn-ea"/>
-                      </a:endParaRPr>
-                    </a:p>
-                  </a:txBody>
-                  <a:tcPr marL="5625" marR="5625" marT="5625" marB="0" anchor="ctr">
-                    <a:lnL>
-                      <a:noFill/>
-                    </a:lnL>
-                    <a:lnR>
-                      <a:noFill/>
-                    </a:lnR>
-                    <a:lnT w="6350" cap="flat" cmpd="sng" algn="ctr">
-                      <a:solidFill>
-                        <a:srgbClr val="000000"/>
-                      </a:solidFill>
-                      <a:prstDash val="solid"/>
-                      <a:round/>
-                      <a:headEnd type="none" w="med" len="med"/>
-                      <a:tailEnd type="none" w="med" len="med"/>
-                    </a:lnT>
-                    <a:lnB w="6350" cap="flat" cmpd="sng" algn="ctr">
-                      <a:solidFill>
-                        <a:srgbClr val="000000"/>
-                      </a:solidFill>
-                      <a:prstDash val="solid"/>
-                      <a:round/>
-                      <a:headEnd type="none" w="med" len="med"/>
-                      <a:tailEnd type="none" w="med" len="med"/>
-                    </a:lnB>
-                    <a:solidFill>
-                      <a:srgbClr val="FFFFFF"/>
-                    </a:solidFill>
-                  </a:tcPr>
-                </a:tc>
-                <a:tc>
-                  <a:txBody>
-                    <a:bodyPr/>
-                    <a:lstStyle/>
-                    <a:p>
-                      <a:pPr algn="ctr" fontAlgn="ctr"/>
-                      <a:endParaRPr lang="en-US" sz="800" b="1" i="0" u="none" strike="noStrike" dirty="0">
-                        <a:solidFill>
-                          <a:srgbClr val="FF0000"/>
-                        </a:solidFill>
-                        <a:effectLst/>
-                        <a:latin typeface="+mn-ea"/>
-                        <a:ea typeface="+mn-ea"/>
-                      </a:endParaRPr>
-                    </a:p>
-                  </a:txBody>
-                  <a:tcPr marL="5625" marR="5625" marT="5625" marB="0" anchor="ctr">
-                    <a:lnL>
-                      <a:noFill/>
-                    </a:lnL>
-                    <a:lnR>
-                      <a:noFill/>
-                    </a:lnR>
-                    <a:lnT w="6350" cap="flat" cmpd="sng" algn="ctr">
-                      <a:solidFill>
-                        <a:srgbClr val="000000"/>
-                      </a:solidFill>
-                      <a:prstDash val="solid"/>
-                      <a:round/>
-                      <a:headEnd type="none" w="med" len="med"/>
-                      <a:tailEnd type="none" w="med" len="med"/>
-                    </a:lnT>
-                    <a:lnB w="6350" cap="flat" cmpd="sng" algn="ctr">
-                      <a:solidFill>
-                        <a:srgbClr val="000000"/>
-                      </a:solidFill>
-                      <a:prstDash val="solid"/>
-                      <a:round/>
-                      <a:headEnd type="none" w="med" len="med"/>
-                      <a:tailEnd type="none" w="med" len="med"/>
-                    </a:lnB>
-                  </a:tcPr>
-                </a:tc>
-                <a:tc>
-                  <a:txBody>
-                    <a:bodyPr/>
-                    <a:lstStyle/>
-                    <a:p>
-                      <a:pPr marL="0" marR="0" lvl="0" indent="0" algn="ctr" defTabSz="914400" rtl="0" eaLnBrk="1" fontAlgn="ctr" latinLnBrk="1" hangingPunct="1">
-                        <a:lnSpc>
-                          <a:spcPct val="100000"/>
-                        </a:lnSpc>
-                        <a:spcBef>
-                          <a:spcPts val="0"/>
-                        </a:spcBef>
-                        <a:spcAft>
-                          <a:spcPts val="0"/>
-                        </a:spcAft>
-                        <a:buClrTx/>
-                        <a:buSzTx/>
-                        <a:buFontTx/>
-                        <a:buNone/>
-                        <a:tabLst/>
-                        <a:defRPr/>
-                      </a:pPr>
-                      <a:endParaRPr lang="en-US" altLang="ko-KR" sz="800" b="1" i="0" u="none" strike="noStrike" kern="1200" dirty="0" smtClean="0">
-                        <a:solidFill>
-                          <a:srgbClr val="FF0000"/>
-                        </a:solidFill>
-                        <a:latin typeface="+mn-ea"/>
-                        <a:ea typeface="+mn-ea"/>
-                        <a:cs typeface="+mn-cs"/>
-                      </a:endParaRPr>
-                    </a:p>
-                  </a:txBody>
-                  <a:tcPr marL="5625" marR="5625" marT="5625" marB="0" anchor="ctr">
-                    <a:lnL>
-                      <a:noFill/>
-                    </a:lnL>
-                    <a:lnR>
-                      <a:noFill/>
-                    </a:lnR>
-                    <a:lnT w="6350" cap="flat" cmpd="sng" algn="ctr">
-                      <a:solidFill>
-                        <a:srgbClr val="000000"/>
-                      </a:solidFill>
-                      <a:prstDash val="solid"/>
-                      <a:round/>
-                      <a:headEnd type="none" w="med" len="med"/>
-                      <a:tailEnd type="none" w="med" len="med"/>
-                    </a:lnT>
-                    <a:lnB w="6350" cap="flat" cmpd="sng" algn="ctr">
-                      <a:solidFill>
-                        <a:srgbClr val="000000"/>
-                      </a:solidFill>
-                      <a:prstDash val="solid"/>
-                      <a:round/>
-                      <a:headEnd type="none" w="med" len="med"/>
-                      <a:tailEnd type="none" w="med" len="med"/>
-                    </a:lnB>
-                    <a:solidFill>
-                      <a:srgbClr val="FFFFFF"/>
-                    </a:solidFill>
-                  </a:tcPr>
-                </a:tc>
-                <a:extLst>
-                  <a:ext uri="{0D108BD9-81ED-4DB2-BD59-A6C34878D82A}">
-                    <a16:rowId xmlns:a16="http://schemas.microsoft.com/office/drawing/2014/main" val="10002"/>
                   </a:ext>
                 </a:extLst>
               </a:tr>
@@ -5064,11 +4736,11 @@
           <a:lstStyle/>
           <a:p>
             <a:r>
-              <a:rPr lang="en-US" altLang="ko-KR" sz="1200" b="1" dirty="0" smtClean="0"/>
+              <a:rPr lang="en-US" altLang="ko-KR" sz="1200" b="1" dirty="0"/>
               <a:t>- Fusion gene</a:t>
             </a:r>
             <a:r>
-              <a:rPr lang="en-US" altLang="ko-KR" sz="1200" dirty="0" smtClean="0"/>
+              <a:rPr lang="en-US" altLang="ko-KR" sz="1200" dirty="0"/>
               <a:t>:</a:t>
             </a:r>
             <a:endParaRPr lang="ko-KR" altLang="en-US" sz="1200" b="1" dirty="0"/>
@@ -5097,11 +4769,11 @@
           <a:lstStyle/>
           <a:p>
             <a:r>
-              <a:rPr lang="en-US" altLang="ko-KR" sz="1200" b="1" dirty="0" smtClean="0"/>
+              <a:rPr lang="en-US" altLang="ko-KR" sz="1200" b="1" dirty="0"/>
               <a:t>- Copy number variation</a:t>
             </a:r>
             <a:r>
-              <a:rPr lang="en-US" altLang="ko-KR" sz="1200" dirty="0" smtClean="0"/>
+              <a:rPr lang="en-US" altLang="ko-KR" sz="1200" dirty="0"/>
               <a:t>:</a:t>
             </a:r>
             <a:endParaRPr lang="ko-KR" altLang="en-US" sz="1200" b="1" dirty="0"/>
@@ -5130,11 +4802,11 @@
           <a:lstStyle/>
           <a:p>
             <a:r>
-              <a:rPr lang="en-US" altLang="ko-KR" sz="1200" b="1" dirty="0" smtClean="0"/>
+              <a:rPr lang="en-US" altLang="ko-KR" sz="1200" b="1" dirty="0"/>
               <a:t>- Splice variant</a:t>
             </a:r>
             <a:r>
-              <a:rPr lang="en-US" altLang="ko-KR" sz="1200" dirty="0" smtClean="0"/>
+              <a:rPr lang="en-US" altLang="ko-KR" sz="1200" dirty="0"/>
               <a:t>:</a:t>
             </a:r>
             <a:endParaRPr lang="ko-KR" altLang="en-US" sz="1200" dirty="0"/>
@@ -5262,7 +4934,7 @@
                     <a:p>
                       <a:pPr algn="ctr" fontAlgn="ctr"/>
                       <a:r>
-                        <a:rPr lang="en-US" sz="800" b="1" i="0" u="none" strike="noStrike" dirty="0" smtClean="0">
+                        <a:rPr lang="en-US" sz="800" b="1" i="0" u="none" strike="noStrike" dirty="0">
                           <a:solidFill>
                             <a:schemeClr val="tx1"/>
                           </a:solidFill>
@@ -5272,14 +4944,6 @@
                         </a:rPr>
                         <a:t>LOCATION</a:t>
                       </a:r>
-                      <a:endParaRPr lang="en-US" sz="800" b="1" i="0" u="none" strike="noStrike" dirty="0">
-                        <a:solidFill>
-                          <a:schemeClr val="tx1"/>
-                        </a:solidFill>
-                        <a:effectLst/>
-                        <a:latin typeface="+mn-ea"/>
-                        <a:ea typeface="+mn-ea"/>
-                      </a:endParaRPr>
                     </a:p>
                   </a:txBody>
                   <a:tcPr marL="5625" marR="5625" marT="5625" marB="0" anchor="ctr">
@@ -5331,7 +4995,7 @@
                     <a:p>
                       <a:pPr algn="ctr" fontAlgn="ctr"/>
                       <a:r>
-                        <a:rPr lang="en-US" sz="800" b="1" i="0" u="none" strike="noStrike" dirty="0" smtClean="0">
+                        <a:rPr lang="en-US" sz="800" b="1" i="0" u="none" strike="noStrike" dirty="0">
                           <a:solidFill>
                             <a:schemeClr val="tx1"/>
                           </a:solidFill>
@@ -5341,14 +5005,6 @@
                         </a:rPr>
                         <a:t>FOLD CHANGE</a:t>
                       </a:r>
-                      <a:endParaRPr lang="en-US" sz="800" b="1" i="0" u="none" strike="noStrike" dirty="0">
-                        <a:solidFill>
-                          <a:schemeClr val="tx1"/>
-                        </a:solidFill>
-                        <a:effectLst/>
-                        <a:latin typeface="+mn-ea"/>
-                        <a:ea typeface="+mn-ea"/>
-                      </a:endParaRPr>
                     </a:p>
                   </a:txBody>
                   <a:tcPr marL="5625" marR="5625" marT="5625" marB="0" anchor="ctr">
@@ -5400,7 +5056,7 @@
                     <a:p>
                       <a:pPr algn="ctr" fontAlgn="ctr"/>
                       <a:r>
-                        <a:rPr lang="en-US" sz="800" b="1" i="0" u="none" strike="noStrike" dirty="0" smtClean="0">
+                        <a:rPr lang="en-US" sz="800" b="1" i="0" u="none" strike="noStrike" dirty="0">
                           <a:solidFill>
                             <a:schemeClr val="tx1"/>
                           </a:solidFill>
@@ -5410,14 +5066,6 @@
                         </a:rPr>
                         <a:t>ESTIMATED COPY NUMBER</a:t>
                       </a:r>
-                      <a:endParaRPr lang="en-US" sz="800" b="1" i="0" u="none" strike="noStrike" dirty="0">
-                        <a:solidFill>
-                          <a:schemeClr val="tx1"/>
-                        </a:solidFill>
-                        <a:effectLst/>
-                        <a:latin typeface="+mn-ea"/>
-                        <a:ea typeface="+mn-ea"/>
-                      </a:endParaRPr>
                     </a:p>
                   </a:txBody>
                   <a:tcPr marL="5625" marR="5625" marT="5625" marB="0" anchor="ctr">
@@ -5717,7 +5365,7 @@
                     <a:p>
                       <a:pPr algn="ctr" fontAlgn="ctr"/>
                       <a:r>
-                        <a:rPr lang="en-US" sz="800" b="1" i="0" u="none" strike="noStrike" baseline="0" dirty="0" smtClean="0">
+                        <a:rPr lang="en-US" sz="800" b="1" i="0" u="none" strike="noStrike" baseline="0" dirty="0">
                           <a:solidFill>
                             <a:srgbClr val="000000"/>
                           </a:solidFill>
@@ -5802,7 +5450,7 @@
                         <a:defRPr/>
                       </a:pPr>
                       <a:r>
-                        <a:rPr lang="en-US" sz="800" b="1" i="0" u="none" strike="noStrike" dirty="0" smtClean="0">
+                        <a:rPr lang="en-US" sz="800" b="1" i="0" u="none" strike="noStrike" dirty="0">
                           <a:solidFill>
                             <a:srgbClr val="000000"/>
                           </a:solidFill>
@@ -5812,14 +5460,6 @@
                         </a:rPr>
                         <a:t>BREAKPOINT 1</a:t>
                       </a:r>
-                      <a:endParaRPr lang="en-US" sz="800" b="1" i="0" u="none" strike="noStrike" dirty="0">
-                        <a:solidFill>
-                          <a:srgbClr val="000000"/>
-                        </a:solidFill>
-                        <a:effectLst/>
-                        <a:latin typeface="+mn-ea"/>
-                        <a:ea typeface="+mn-ea"/>
-                      </a:endParaRPr>
                     </a:p>
                   </a:txBody>
                   <a:tcPr marL="5625" marR="5625" marT="5625" marB="0" anchor="ctr">
@@ -5887,7 +5527,7 @@
                         <a:defRPr/>
                       </a:pPr>
                       <a:r>
-                        <a:rPr lang="en-US" altLang="ko-KR" sz="800" b="1" i="0" u="none" strike="noStrike" dirty="0" smtClean="0">
+                        <a:rPr lang="en-US" altLang="ko-KR" sz="800" b="1" i="0" u="none" strike="noStrike" dirty="0">
                           <a:solidFill>
                             <a:srgbClr val="000000"/>
                           </a:solidFill>
@@ -5897,14 +5537,6 @@
                         </a:rPr>
                         <a:t>BREAKPOINT 2</a:t>
                       </a:r>
-                      <a:endParaRPr lang="en-US" altLang="ko-KR" sz="800" b="1" i="0" u="none" strike="noStrike" dirty="0">
-                        <a:solidFill>
-                          <a:srgbClr val="000000"/>
-                        </a:solidFill>
-                        <a:effectLst/>
-                        <a:latin typeface="+mn-ea"/>
-                        <a:ea typeface="+mn-ea"/>
-                      </a:endParaRPr>
                     </a:p>
                   </a:txBody>
                   <a:tcPr marL="5625" marR="5625" marT="5625" marB="0" anchor="ctr">
@@ -5956,7 +5588,7 @@
                     <a:p>
                       <a:pPr algn="ctr" fontAlgn="ctr"/>
                       <a:r>
-                        <a:rPr lang="en-US" sz="800" b="1" i="0" u="none" strike="noStrike" dirty="0" smtClean="0">
+                        <a:rPr lang="en-US" sz="800" b="1" i="0" u="none" strike="noStrike" dirty="0">
                           <a:solidFill>
                             <a:srgbClr val="000000"/>
                           </a:solidFill>
@@ -5966,14 +5598,6 @@
                         </a:rPr>
                         <a:t>FUSION SUPPORTING READS</a:t>
                       </a:r>
-                      <a:endParaRPr lang="en-US" sz="800" b="1" i="0" u="none" strike="noStrike" dirty="0">
-                        <a:solidFill>
-                          <a:srgbClr val="000000"/>
-                        </a:solidFill>
-                        <a:effectLst/>
-                        <a:latin typeface="+mn-ea"/>
-                        <a:ea typeface="+mn-ea"/>
-                      </a:endParaRPr>
                     </a:p>
                   </a:txBody>
                   <a:tcPr marL="5625" marR="5625" marT="5625" marB="0" anchor="ctr">
@@ -6235,7 +5859,7 @@
           <a:lstStyle/>
           <a:p>
             <a:r>
-              <a:rPr lang="en-US" altLang="ko-KR" sz="1200" b="1" dirty="0" smtClean="0"/>
+              <a:rPr lang="en-US" altLang="ko-KR" sz="1200" b="1" dirty="0"/>
               <a:t>- Other Biomarkers</a:t>
             </a:r>
             <a:endParaRPr lang="ko-KR" altLang="en-US" sz="1200" dirty="0"/>
@@ -6309,7 +5933,7 @@
                     <a:p>
                       <a:pPr marL="0" algn="ctr" defTabSz="914400" rtl="0" eaLnBrk="1" fontAlgn="ctr" latinLnBrk="1" hangingPunct="1"/>
                       <a:r>
-                        <a:rPr lang="en-US" sz="800" b="1" i="0" u="none" strike="noStrike" kern="1200" dirty="0" smtClean="0">
+                        <a:rPr lang="en-US" sz="800" b="1" i="0" u="none" strike="noStrike" kern="1200" dirty="0">
                           <a:solidFill>
                             <a:srgbClr val="000000"/>
                           </a:solidFill>
@@ -6320,15 +5944,6 @@
                         </a:rPr>
                         <a:t>GENE</a:t>
                       </a:r>
-                      <a:endParaRPr lang="en-US" sz="800" b="1" i="0" u="none" strike="noStrike" kern="1200" dirty="0">
-                        <a:solidFill>
-                          <a:srgbClr val="000000"/>
-                        </a:solidFill>
-                        <a:effectLst/>
-                        <a:latin typeface="+mn-ea"/>
-                        <a:ea typeface="+mn-ea"/>
-                        <a:cs typeface="+mn-cs"/>
-                      </a:endParaRPr>
                     </a:p>
                   </a:txBody>
                   <a:tcPr marL="9525" marR="9525" marT="9525" marB="0" anchor="ctr">
@@ -6380,7 +5995,7 @@
                     <a:p>
                       <a:pPr algn="ctr" fontAlgn="ctr"/>
                       <a:r>
-                        <a:rPr lang="en-US" altLang="ko-KR" sz="800" b="1" i="0" u="none" strike="noStrike" dirty="0" smtClean="0">
+                        <a:rPr lang="en-US" altLang="ko-KR" sz="800" b="1" i="0" u="none" strike="noStrike" dirty="0">
                           <a:solidFill>
                             <a:srgbClr val="000000"/>
                           </a:solidFill>
@@ -6391,7 +6006,7 @@
                         <a:t>AFFECTED</a:t>
                       </a:r>
                       <a:r>
-                        <a:rPr lang="ko-KR" altLang="en-US" sz="800" b="1" i="0" u="none" strike="noStrike" dirty="0" smtClean="0">
+                        <a:rPr lang="ko-KR" altLang="en-US" sz="800" b="1" i="0" u="none" strike="noStrike" dirty="0">
                           <a:solidFill>
                             <a:srgbClr val="000000"/>
                           </a:solidFill>
@@ -6402,7 +6017,7 @@
                         <a:t> </a:t>
                       </a:r>
                       <a:r>
-                        <a:rPr lang="en-US" altLang="ko-KR" sz="800" b="1" i="0" u="none" strike="noStrike" dirty="0" smtClean="0">
+                        <a:rPr lang="en-US" altLang="ko-KR" sz="800" b="1" i="0" u="none" strike="noStrike" dirty="0">
                           <a:solidFill>
                             <a:srgbClr val="000000"/>
                           </a:solidFill>
@@ -6471,7 +6086,7 @@
                     <a:p>
                       <a:pPr algn="ctr" fontAlgn="ctr"/>
                       <a:r>
-                        <a:rPr lang="en-US" sz="800" b="1" i="0" u="none" strike="noStrike" dirty="0" smtClean="0">
+                        <a:rPr lang="en-US" sz="800" b="1" i="0" u="none" strike="noStrike" dirty="0">
                           <a:solidFill>
                             <a:srgbClr val="000000"/>
                           </a:solidFill>
@@ -6479,10 +6094,60 @@
                           <a:latin typeface="+mn-ea"/>
                           <a:ea typeface="+mn-ea"/>
                         </a:rPr>
-                        <a:t>BREAKPOINT </a:t>
-                      </a:r>
-                      <a:r>
-                        <a:rPr lang="en-US" sz="800" b="1" i="0" u="none" strike="noStrike" dirty="0">
+                        <a:t>BREAKPOINT 1</a:t>
+                      </a:r>
+                    </a:p>
+                  </a:txBody>
+                  <a:tcPr marL="9525" marR="9525" marT="9525" marB="0" anchor="ctr">
+                    <a:lnL w="6350" cap="flat" cmpd="sng" algn="ctr">
+                      <a:solidFill>
+                        <a:srgbClr val="000000"/>
+                      </a:solidFill>
+                      <a:prstDash val="solid"/>
+                      <a:round/>
+                      <a:headEnd type="none" w="med" len="med"/>
+                      <a:tailEnd type="none" w="med" len="med"/>
+                    </a:lnL>
+                    <a:lnR w="6350" cap="flat" cmpd="sng" algn="ctr">
+                      <a:solidFill>
+                        <a:srgbClr val="000000"/>
+                      </a:solidFill>
+                      <a:prstDash val="solid"/>
+                      <a:round/>
+                      <a:headEnd type="none" w="med" len="med"/>
+                      <a:tailEnd type="none" w="med" len="med"/>
+                    </a:lnR>
+                    <a:lnT w="6350" cap="flat" cmpd="sng" algn="ctr">
+                      <a:solidFill>
+                        <a:srgbClr val="000000"/>
+                      </a:solidFill>
+                      <a:prstDash val="solid"/>
+                      <a:round/>
+                      <a:headEnd type="none" w="med" len="med"/>
+                      <a:tailEnd type="none" w="med" len="med"/>
+                    </a:lnT>
+                    <a:lnB w="6350" cap="flat" cmpd="sng" algn="ctr">
+                      <a:solidFill>
+                        <a:srgbClr val="000000"/>
+                      </a:solidFill>
+                      <a:prstDash val="solid"/>
+                      <a:round/>
+                      <a:headEnd type="none" w="med" len="med"/>
+                      <a:tailEnd type="none" w="med" len="med"/>
+                    </a:lnB>
+                    <a:solidFill>
+                      <a:srgbClr val="DCE6F1"/>
+                    </a:solidFill>
+                  </a:tcPr>
+                </a:tc>
+                <a:tc>
+                  <a:txBody>
+                    <a:bodyPr/>
+                    <a:lstStyle/>
+                    <a:p>
+                      <a:pPr algn="ctr" fontAlgn="ctr"/>
+                      <a:r>
+                        <a:rPr lang="en-US" altLang="ko-KR" sz="800" b="1" i="0" u="none" strike="noStrike" dirty="0">
                           <a:solidFill>
                             <a:srgbClr val="000000"/>
                           </a:solidFill>
@@ -6490,7 +6155,18 @@
                           <a:latin typeface="+mn-ea"/>
                           <a:ea typeface="+mn-ea"/>
                         </a:rPr>
-                        <a:t>1</a:t>
+                        <a:t>BREAKPOINT</a:t>
+                      </a:r>
+                      <a:r>
+                        <a:rPr lang="en-US" sz="800" b="1" i="0" u="none" strike="noStrike" dirty="0">
+                          <a:solidFill>
+                            <a:srgbClr val="000000"/>
+                          </a:solidFill>
+                          <a:effectLst/>
+                          <a:latin typeface="+mn-ea"/>
+                          <a:ea typeface="+mn-ea"/>
+                        </a:rPr>
+                        <a:t> 2</a:t>
                       </a:r>
                     </a:p>
                   </a:txBody>
@@ -6543,7 +6219,7 @@
                     <a:p>
                       <a:pPr algn="ctr" fontAlgn="ctr"/>
                       <a:r>
-                        <a:rPr lang="en-US" altLang="ko-KR" sz="800" b="1" i="0" u="none" strike="noStrike" dirty="0" smtClean="0">
+                        <a:rPr lang="en-US" sz="800" b="1" i="0" u="none" strike="noStrike" dirty="0">
                           <a:solidFill>
                             <a:srgbClr val="000000"/>
                           </a:solidFill>
@@ -6551,93 +6227,10 @@
                           <a:latin typeface="+mn-ea"/>
                           <a:ea typeface="+mn-ea"/>
                         </a:rPr>
-                        <a:t>BREAKPOINT</a:t>
-                      </a:r>
-                      <a:r>
-                        <a:rPr lang="en-US" sz="800" b="1" i="0" u="none" strike="noStrike" dirty="0" smtClean="0">
-                          <a:solidFill>
-                            <a:srgbClr val="000000"/>
-                          </a:solidFill>
-                          <a:effectLst/>
-                          <a:latin typeface="+mn-ea"/>
-                          <a:ea typeface="+mn-ea"/>
-                        </a:rPr>
-                        <a:t> </a:t>
-                      </a:r>
-                      <a:r>
-                        <a:rPr lang="en-US" sz="800" b="1" i="0" u="none" strike="noStrike" dirty="0">
-                          <a:solidFill>
-                            <a:srgbClr val="000000"/>
-                          </a:solidFill>
-                          <a:effectLst/>
-                          <a:latin typeface="+mn-ea"/>
-                          <a:ea typeface="+mn-ea"/>
-                        </a:rPr>
-                        <a:t>2</a:t>
-                      </a:r>
-                    </a:p>
-                  </a:txBody>
-                  <a:tcPr marL="9525" marR="9525" marT="9525" marB="0" anchor="ctr">
-                    <a:lnL w="6350" cap="flat" cmpd="sng" algn="ctr">
-                      <a:solidFill>
-                        <a:srgbClr val="000000"/>
-                      </a:solidFill>
-                      <a:prstDash val="solid"/>
-                      <a:round/>
-                      <a:headEnd type="none" w="med" len="med"/>
-                      <a:tailEnd type="none" w="med" len="med"/>
-                    </a:lnL>
-                    <a:lnR w="6350" cap="flat" cmpd="sng" algn="ctr">
-                      <a:solidFill>
-                        <a:srgbClr val="000000"/>
-                      </a:solidFill>
-                      <a:prstDash val="solid"/>
-                      <a:round/>
-                      <a:headEnd type="none" w="med" len="med"/>
-                      <a:tailEnd type="none" w="med" len="med"/>
-                    </a:lnR>
-                    <a:lnT w="6350" cap="flat" cmpd="sng" algn="ctr">
-                      <a:solidFill>
-                        <a:srgbClr val="000000"/>
-                      </a:solidFill>
-                      <a:prstDash val="solid"/>
-                      <a:round/>
-                      <a:headEnd type="none" w="med" len="med"/>
-                      <a:tailEnd type="none" w="med" len="med"/>
-                    </a:lnT>
-                    <a:lnB w="6350" cap="flat" cmpd="sng" algn="ctr">
-                      <a:solidFill>
-                        <a:srgbClr val="000000"/>
-                      </a:solidFill>
-                      <a:prstDash val="solid"/>
-                      <a:round/>
-                      <a:headEnd type="none" w="med" len="med"/>
-                      <a:tailEnd type="none" w="med" len="med"/>
-                    </a:lnB>
-                    <a:solidFill>
-                      <a:srgbClr val="DCE6F1"/>
-                    </a:solidFill>
-                  </a:tcPr>
-                </a:tc>
-                <a:tc>
-                  <a:txBody>
-                    <a:bodyPr/>
-                    <a:lstStyle/>
-                    <a:p>
-                      <a:pPr algn="ctr" fontAlgn="ctr"/>
-                      <a:r>
-                        <a:rPr lang="en-US" sz="800" b="1" i="0" u="none" strike="noStrike" dirty="0" smtClean="0">
-                          <a:solidFill>
-                            <a:srgbClr val="000000"/>
-                          </a:solidFill>
-                          <a:effectLst/>
-                          <a:latin typeface="+mn-ea"/>
-                          <a:ea typeface="+mn-ea"/>
-                        </a:rPr>
                         <a:t>SPLICE SUPPORTING</a:t>
                       </a:r>
                       <a:r>
-                        <a:rPr lang="en-US" sz="800" b="1" i="0" u="none" strike="noStrike" baseline="0" dirty="0" smtClean="0">
+                        <a:rPr lang="en-US" sz="800" b="1" i="0" u="none" strike="noStrike" baseline="0" dirty="0">
                           <a:solidFill>
                             <a:srgbClr val="000000"/>
                           </a:solidFill>
@@ -8929,12 +8522,8 @@
                         </a:defRPr>
                       </a:pPr>
                       <a:r>
-                        <a:rPr dirty="0" smtClean="0"/>
-                        <a:t> </a:t>
-                      </a:r>
-                      <a:r>
                         <a:rPr dirty="0"/>
-                        <a:t>/</a:t>
+                        <a:t> /</a:t>
                       </a:r>
                       <a:r>
                         <a:rPr dirty="0" err="1"/>
@@ -8980,12 +8569,8 @@
                         </a:defRPr>
                       </a:pPr>
                       <a:r>
-                        <a:rPr dirty="0" smtClean="0"/>
-                        <a:t> </a:t>
-                      </a:r>
-                      <a:r>
                         <a:rPr dirty="0"/>
-                        <a:t>%</a:t>
+                        <a:t> %</a:t>
                       </a:r>
                     </a:p>
                   </a:txBody>
@@ -9028,13 +8613,6 @@
   <p:clrMapOvr>
     <a:masterClrMapping/>
   </p:clrMapOvr>
-  <p:timing>
-    <p:tnLst>
-      <p:par>
-        <p:cTn id="1" dur="indefinite" restart="never" nodeType="tmRoot"/>
-      </p:par>
-    </p:tnLst>
-  </p:timing>
 </p:sld>
 </file>
 
@@ -9358,7 +8936,7 @@
                     <a:p>
                       <a:pPr algn="ctr" fontAlgn="ctr"/>
                       <a:r>
-                        <a:rPr lang="en-US" sz="800" b="1" i="0" u="none" strike="noStrike" dirty="0" smtClean="0">
+                        <a:rPr lang="en-US" sz="800" b="1" i="0" u="none" strike="noStrike" dirty="0">
                           <a:solidFill>
                             <a:srgbClr val="000000"/>
                           </a:solidFill>
@@ -9367,6 +8945,67 @@
                           <a:ea typeface="+mn-ea"/>
                         </a:rPr>
                         <a:t>VAF (%)</a:t>
+                      </a:r>
+                    </a:p>
+                  </a:txBody>
+                  <a:tcPr marL="5625" marR="5625" marT="5625" marB="0" anchor="ctr">
+                    <a:lnL w="6350" cap="flat" cmpd="sng" algn="ctr">
+                      <a:solidFill>
+                        <a:srgbClr val="000000"/>
+                      </a:solidFill>
+                      <a:prstDash val="solid"/>
+                      <a:round/>
+                      <a:headEnd type="none" w="med" len="med"/>
+                      <a:tailEnd type="none" w="med" len="med"/>
+                    </a:lnL>
+                    <a:lnR w="6350" cap="flat" cmpd="sng" algn="ctr">
+                      <a:solidFill>
+                        <a:srgbClr val="000000"/>
+                      </a:solidFill>
+                      <a:prstDash val="solid"/>
+                      <a:round/>
+                      <a:headEnd type="none" w="med" len="med"/>
+                      <a:tailEnd type="none" w="med" len="med"/>
+                    </a:lnR>
+                    <a:lnT w="6350" cap="flat" cmpd="sng" algn="ctr">
+                      <a:solidFill>
+                        <a:srgbClr val="000000"/>
+                      </a:solidFill>
+                      <a:prstDash val="solid"/>
+                      <a:round/>
+                      <a:headEnd type="none" w="med" len="med"/>
+                      <a:tailEnd type="none" w="med" len="med"/>
+                    </a:lnT>
+                    <a:lnB w="6350" cap="flat" cmpd="sng" algn="ctr">
+                      <a:solidFill>
+                        <a:srgbClr val="000000"/>
+                      </a:solidFill>
+                      <a:prstDash val="solid"/>
+                      <a:round/>
+                      <a:headEnd type="none" w="med" len="med"/>
+                      <a:tailEnd type="none" w="med" len="med"/>
+                    </a:lnB>
+                    <a:solidFill>
+                      <a:srgbClr val="DCE6F1"/>
+                    </a:solidFill>
+                  </a:tcPr>
+                </a:tc>
+                <a:tc>
+                  <a:txBody>
+                    <a:bodyPr/>
+                    <a:lstStyle/>
+                    <a:p>
+                      <a:pPr algn="ctr" fontAlgn="ctr"/>
+                      <a:r>
+                        <a:rPr lang="en-US" sz="800" b="1" i="0" u="none" strike="noStrike" dirty="0" err="1">
+                          <a:solidFill>
+                            <a:srgbClr val="000000"/>
+                          </a:solidFill>
+                          <a:effectLst/>
+                          <a:latin typeface="+mn-ea"/>
+                          <a:ea typeface="+mn-ea"/>
+                        </a:rPr>
+                        <a:t>HGVSc</a:t>
                       </a:r>
                       <a:endParaRPr lang="en-US" sz="800" b="1" i="0" u="none" strike="noStrike" dirty="0">
                         <a:solidFill>
@@ -9427,7 +9066,7 @@
                     <a:p>
                       <a:pPr algn="ctr" fontAlgn="ctr"/>
                       <a:r>
-                        <a:rPr lang="en-US" sz="800" b="1" i="0" u="none" strike="noStrike" dirty="0" err="1" smtClean="0">
+                        <a:rPr lang="en-US" sz="800" b="1" i="0" u="none" strike="noStrike" dirty="0" err="1">
                           <a:solidFill>
                             <a:srgbClr val="000000"/>
                           </a:solidFill>
@@ -9435,78 +9074,9 @@
                           <a:latin typeface="+mn-ea"/>
                           <a:ea typeface="+mn-ea"/>
                         </a:rPr>
-                        <a:t>HGVSc</a:t>
+                        <a:t>HGVSp</a:t>
                       </a:r>
                       <a:endParaRPr lang="en-US" sz="800" b="1" i="0" u="none" strike="noStrike" dirty="0">
-                        <a:solidFill>
-                          <a:srgbClr val="000000"/>
-                        </a:solidFill>
-                        <a:effectLst/>
-                        <a:latin typeface="+mn-ea"/>
-                        <a:ea typeface="+mn-ea"/>
-                      </a:endParaRPr>
-                    </a:p>
-                  </a:txBody>
-                  <a:tcPr marL="5625" marR="5625" marT="5625" marB="0" anchor="ctr">
-                    <a:lnL w="6350" cap="flat" cmpd="sng" algn="ctr">
-                      <a:solidFill>
-                        <a:srgbClr val="000000"/>
-                      </a:solidFill>
-                      <a:prstDash val="solid"/>
-                      <a:round/>
-                      <a:headEnd type="none" w="med" len="med"/>
-                      <a:tailEnd type="none" w="med" len="med"/>
-                    </a:lnL>
-                    <a:lnR w="6350" cap="flat" cmpd="sng" algn="ctr">
-                      <a:solidFill>
-                        <a:srgbClr val="000000"/>
-                      </a:solidFill>
-                      <a:prstDash val="solid"/>
-                      <a:round/>
-                      <a:headEnd type="none" w="med" len="med"/>
-                      <a:tailEnd type="none" w="med" len="med"/>
-                    </a:lnR>
-                    <a:lnT w="6350" cap="flat" cmpd="sng" algn="ctr">
-                      <a:solidFill>
-                        <a:srgbClr val="000000"/>
-                      </a:solidFill>
-                      <a:prstDash val="solid"/>
-                      <a:round/>
-                      <a:headEnd type="none" w="med" len="med"/>
-                      <a:tailEnd type="none" w="med" len="med"/>
-                    </a:lnT>
-                    <a:lnB w="6350" cap="flat" cmpd="sng" algn="ctr">
-                      <a:solidFill>
-                        <a:srgbClr val="000000"/>
-                      </a:solidFill>
-                      <a:prstDash val="solid"/>
-                      <a:round/>
-                      <a:headEnd type="none" w="med" len="med"/>
-                      <a:tailEnd type="none" w="med" len="med"/>
-                    </a:lnB>
-                    <a:solidFill>
-                      <a:srgbClr val="DCE6F1"/>
-                    </a:solidFill>
-                  </a:tcPr>
-                </a:tc>
-                <a:tc>
-                  <a:txBody>
-                    <a:bodyPr/>
-                    <a:lstStyle/>
-                    <a:p>
-                      <a:pPr algn="ctr" fontAlgn="ctr"/>
-                      <a:r>
-                        <a:rPr lang="en-US" sz="800" b="1" i="0" u="none" strike="noStrike" dirty="0" err="1" smtClean="0">
-                          <a:solidFill>
-                            <a:srgbClr val="000000"/>
-                          </a:solidFill>
-                          <a:effectLst/>
-                          <a:latin typeface="+mn-ea"/>
-                          <a:ea typeface="+mn-ea"/>
-                        </a:rPr>
-                        <a:t>HGVSp</a:t>
-                      </a:r>
-                      <a:endParaRPr lang="en-US" sz="800" b="1" i="0" u="none" strike="noStrike" dirty="0" smtClean="0">
                         <a:solidFill>
                           <a:srgbClr val="000000"/>
                         </a:solidFill>
@@ -9811,7 +9381,7 @@
                         <a:tabLst/>
                         <a:defRPr/>
                       </a:pPr>
-                      <a:endParaRPr lang="en-US" altLang="ko-KR" sz="800" b="1" i="0" u="none" strike="noStrike" kern="1200" dirty="0" smtClean="0">
+                      <a:endParaRPr lang="en-US" altLang="ko-KR" sz="800" b="1" i="0" u="none" strike="noStrike" kern="1200" dirty="0">
                         <a:solidFill>
                           <a:srgbClr val="FF0000"/>
                         </a:solidFill>
@@ -10105,7 +9675,7 @@
                         <a:tabLst/>
                         <a:defRPr/>
                       </a:pPr>
-                      <a:endParaRPr lang="en-US" altLang="ko-KR" sz="800" b="1" i="0" u="none" strike="noStrike" kern="1200" dirty="0" smtClean="0">
+                      <a:endParaRPr lang="en-US" altLang="ko-KR" sz="800" b="1" i="0" u="none" strike="noStrike" kern="1200" dirty="0">
                         <a:solidFill>
                           <a:srgbClr val="FF0000"/>
                         </a:solidFill>
@@ -10207,15 +9777,11 @@
           <a:lstStyle/>
           <a:p>
             <a:r>
-              <a:rPr lang="en-US" altLang="ko-KR" sz="1200" b="1" dirty="0" smtClean="0"/>
-              <a:t>- SNVs </a:t>
+              <a:rPr lang="en-US" altLang="ko-KR" sz="1200" b="1" dirty="0"/>
+              <a:t>- SNVs &amp; </a:t>
             </a:r>
             <a:r>
-              <a:rPr lang="en-US" altLang="ko-KR" sz="1200" b="1" dirty="0"/>
-              <a:t>&amp; </a:t>
-            </a:r>
-            <a:r>
-              <a:rPr lang="en-US" altLang="ko-KR" sz="1200" b="1" dirty="0" err="1" smtClean="0"/>
+              <a:rPr lang="en-US" altLang="ko-KR" sz="1200" b="1" dirty="0" err="1"/>
               <a:t>Indels</a:t>
             </a:r>
             <a:endParaRPr lang="ko-KR" altLang="en-US" sz="1200" b="1" dirty="0"/>
@@ -10244,11 +9810,11 @@
           <a:lstStyle/>
           <a:p>
             <a:r>
-              <a:rPr lang="en-US" altLang="ko-KR" sz="1200" b="1" dirty="0" smtClean="0"/>
+              <a:rPr lang="en-US" altLang="ko-KR" sz="1200" b="1" dirty="0"/>
               <a:t>- Fusion gene</a:t>
             </a:r>
             <a:r>
-              <a:rPr lang="en-US" altLang="ko-KR" sz="1200" dirty="0" smtClean="0"/>
+              <a:rPr lang="en-US" altLang="ko-KR" sz="1200" dirty="0"/>
               <a:t>:</a:t>
             </a:r>
             <a:endParaRPr lang="ko-KR" altLang="en-US" sz="1200" b="1" dirty="0"/>
@@ -10277,11 +9843,11 @@
           <a:lstStyle/>
           <a:p>
             <a:r>
-              <a:rPr lang="en-US" altLang="ko-KR" sz="1200" b="1" dirty="0" smtClean="0"/>
+              <a:rPr lang="en-US" altLang="ko-KR" sz="1200" b="1" dirty="0"/>
               <a:t>- Copy number variation</a:t>
             </a:r>
             <a:r>
-              <a:rPr lang="en-US" altLang="ko-KR" sz="1200" dirty="0" smtClean="0"/>
+              <a:rPr lang="en-US" altLang="ko-KR" sz="1200" dirty="0"/>
               <a:t>:</a:t>
             </a:r>
             <a:endParaRPr lang="ko-KR" altLang="en-US" sz="1200" b="1" dirty="0"/>
@@ -10310,11 +9876,11 @@
           <a:lstStyle/>
           <a:p>
             <a:r>
-              <a:rPr lang="en-US" altLang="ko-KR" sz="1200" b="1" dirty="0" smtClean="0"/>
+              <a:rPr lang="en-US" altLang="ko-KR" sz="1200" b="1" dirty="0"/>
               <a:t>- Splice variant</a:t>
             </a:r>
             <a:r>
-              <a:rPr lang="en-US" altLang="ko-KR" sz="1200" dirty="0" smtClean="0"/>
+              <a:rPr lang="en-US" altLang="ko-KR" sz="1200" dirty="0"/>
               <a:t>:</a:t>
             </a:r>
             <a:endParaRPr lang="ko-KR" altLang="en-US" sz="1200" dirty="0"/>
@@ -10442,7 +10008,7 @@
                     <a:p>
                       <a:pPr algn="ctr" fontAlgn="ctr"/>
                       <a:r>
-                        <a:rPr lang="en-US" sz="800" b="1" i="0" u="none" strike="noStrike" dirty="0" smtClean="0">
+                        <a:rPr lang="en-US" sz="800" b="1" i="0" u="none" strike="noStrike" dirty="0">
                           <a:solidFill>
                             <a:schemeClr val="tx1"/>
                           </a:solidFill>
@@ -10452,14 +10018,6 @@
                         </a:rPr>
                         <a:t>LOCATION</a:t>
                       </a:r>
-                      <a:endParaRPr lang="en-US" sz="800" b="1" i="0" u="none" strike="noStrike" dirty="0">
-                        <a:solidFill>
-                          <a:schemeClr val="tx1"/>
-                        </a:solidFill>
-                        <a:effectLst/>
-                        <a:latin typeface="+mn-ea"/>
-                        <a:ea typeface="+mn-ea"/>
-                      </a:endParaRPr>
                     </a:p>
                   </a:txBody>
                   <a:tcPr marL="5625" marR="5625" marT="5625" marB="0" anchor="ctr">
@@ -10511,7 +10069,7 @@
                     <a:p>
                       <a:pPr algn="ctr" fontAlgn="ctr"/>
                       <a:r>
-                        <a:rPr lang="en-US" sz="800" b="1" i="0" u="none" strike="noStrike" dirty="0" smtClean="0">
+                        <a:rPr lang="en-US" sz="800" b="1" i="0" u="none" strike="noStrike" dirty="0">
                           <a:solidFill>
                             <a:schemeClr val="tx1"/>
                           </a:solidFill>
@@ -10521,14 +10079,6 @@
                         </a:rPr>
                         <a:t>FOLD CHANGE</a:t>
                       </a:r>
-                      <a:endParaRPr lang="en-US" sz="800" b="1" i="0" u="none" strike="noStrike" dirty="0">
-                        <a:solidFill>
-                          <a:schemeClr val="tx1"/>
-                        </a:solidFill>
-                        <a:effectLst/>
-                        <a:latin typeface="+mn-ea"/>
-                        <a:ea typeface="+mn-ea"/>
-                      </a:endParaRPr>
                     </a:p>
                   </a:txBody>
                   <a:tcPr marL="5625" marR="5625" marT="5625" marB="0" anchor="ctr">
@@ -10580,7 +10130,7 @@
                     <a:p>
                       <a:pPr algn="ctr" fontAlgn="ctr"/>
                       <a:r>
-                        <a:rPr lang="en-US" sz="800" b="1" i="0" u="none" strike="noStrike" dirty="0" smtClean="0">
+                        <a:rPr lang="en-US" sz="800" b="1" i="0" u="none" strike="noStrike" dirty="0">
                           <a:solidFill>
                             <a:schemeClr val="tx1"/>
                           </a:solidFill>
@@ -10590,14 +10140,6 @@
                         </a:rPr>
                         <a:t>ESTIMATED COPY NUMBER</a:t>
                       </a:r>
-                      <a:endParaRPr lang="en-US" sz="800" b="1" i="0" u="none" strike="noStrike" dirty="0">
-                        <a:solidFill>
-                          <a:schemeClr val="tx1"/>
-                        </a:solidFill>
-                        <a:effectLst/>
-                        <a:latin typeface="+mn-ea"/>
-                        <a:ea typeface="+mn-ea"/>
-                      </a:endParaRPr>
                     </a:p>
                   </a:txBody>
                   <a:tcPr marL="5625" marR="5625" marT="5625" marB="0" anchor="ctr">
@@ -10897,7 +10439,7 @@
                     <a:p>
                       <a:pPr algn="ctr" fontAlgn="ctr"/>
                       <a:r>
-                        <a:rPr lang="en-US" sz="800" b="1" i="0" u="none" strike="noStrike" baseline="0" dirty="0" smtClean="0">
+                        <a:rPr lang="en-US" sz="800" b="1" i="0" u="none" strike="noStrike" baseline="0" dirty="0">
                           <a:solidFill>
                             <a:srgbClr val="000000"/>
                           </a:solidFill>
@@ -10982,7 +10524,7 @@
                         <a:defRPr/>
                       </a:pPr>
                       <a:r>
-                        <a:rPr lang="en-US" sz="800" b="1" i="0" u="none" strike="noStrike" dirty="0" smtClean="0">
+                        <a:rPr lang="en-US" sz="800" b="1" i="0" u="none" strike="noStrike" dirty="0">
                           <a:solidFill>
                             <a:srgbClr val="000000"/>
                           </a:solidFill>
@@ -10992,14 +10534,6 @@
                         </a:rPr>
                         <a:t>BREAKPOINT 1</a:t>
                       </a:r>
-                      <a:endParaRPr lang="en-US" sz="800" b="1" i="0" u="none" strike="noStrike" dirty="0">
-                        <a:solidFill>
-                          <a:srgbClr val="000000"/>
-                        </a:solidFill>
-                        <a:effectLst/>
-                        <a:latin typeface="+mn-ea"/>
-                        <a:ea typeface="+mn-ea"/>
-                      </a:endParaRPr>
                     </a:p>
                   </a:txBody>
                   <a:tcPr marL="5625" marR="5625" marT="5625" marB="0" anchor="ctr">
@@ -11067,7 +10601,7 @@
                         <a:defRPr/>
                       </a:pPr>
                       <a:r>
-                        <a:rPr lang="en-US" altLang="ko-KR" sz="800" b="1" i="0" u="none" strike="noStrike" dirty="0" smtClean="0">
+                        <a:rPr lang="en-US" altLang="ko-KR" sz="800" b="1" i="0" u="none" strike="noStrike" dirty="0">
                           <a:solidFill>
                             <a:srgbClr val="000000"/>
                           </a:solidFill>
@@ -11077,14 +10611,6 @@
                         </a:rPr>
                         <a:t>BREAKPOINT 2</a:t>
                       </a:r>
-                      <a:endParaRPr lang="en-US" altLang="ko-KR" sz="800" b="1" i="0" u="none" strike="noStrike" dirty="0">
-                        <a:solidFill>
-                          <a:srgbClr val="000000"/>
-                        </a:solidFill>
-                        <a:effectLst/>
-                        <a:latin typeface="+mn-ea"/>
-                        <a:ea typeface="+mn-ea"/>
-                      </a:endParaRPr>
                     </a:p>
                   </a:txBody>
                   <a:tcPr marL="5625" marR="5625" marT="5625" marB="0" anchor="ctr">
@@ -11136,7 +10662,7 @@
                     <a:p>
                       <a:pPr algn="ctr" fontAlgn="ctr"/>
                       <a:r>
-                        <a:rPr lang="en-US" sz="800" b="1" i="0" u="none" strike="noStrike" dirty="0" smtClean="0">
+                        <a:rPr lang="en-US" sz="800" b="1" i="0" u="none" strike="noStrike" dirty="0">
                           <a:solidFill>
                             <a:srgbClr val="000000"/>
                           </a:solidFill>
@@ -11146,14 +10672,6 @@
                         </a:rPr>
                         <a:t>FUSION SUPPORTING READS</a:t>
                       </a:r>
-                      <a:endParaRPr lang="en-US" sz="800" b="1" i="0" u="none" strike="noStrike" dirty="0">
-                        <a:solidFill>
-                          <a:srgbClr val="000000"/>
-                        </a:solidFill>
-                        <a:effectLst/>
-                        <a:latin typeface="+mn-ea"/>
-                        <a:ea typeface="+mn-ea"/>
-                      </a:endParaRPr>
                     </a:p>
                   </a:txBody>
                   <a:tcPr marL="5625" marR="5625" marT="5625" marB="0" anchor="ctr">
@@ -11460,7 +10978,7 @@
                     <a:p>
                       <a:pPr marL="0" algn="ctr" defTabSz="914400" rtl="0" eaLnBrk="1" fontAlgn="ctr" latinLnBrk="1" hangingPunct="1"/>
                       <a:r>
-                        <a:rPr lang="en-US" sz="800" b="1" i="0" u="none" strike="noStrike" kern="1200" dirty="0" smtClean="0">
+                        <a:rPr lang="en-US" sz="800" b="1" i="0" u="none" strike="noStrike" kern="1200" dirty="0">
                           <a:solidFill>
                             <a:srgbClr val="000000"/>
                           </a:solidFill>
@@ -11471,15 +10989,6 @@
                         </a:rPr>
                         <a:t>GENE</a:t>
                       </a:r>
-                      <a:endParaRPr lang="en-US" sz="800" b="1" i="0" u="none" strike="noStrike" kern="1200" dirty="0">
-                        <a:solidFill>
-                          <a:srgbClr val="000000"/>
-                        </a:solidFill>
-                        <a:effectLst/>
-                        <a:latin typeface="+mn-ea"/>
-                        <a:ea typeface="+mn-ea"/>
-                        <a:cs typeface="+mn-cs"/>
-                      </a:endParaRPr>
                     </a:p>
                   </a:txBody>
                   <a:tcPr marL="9525" marR="9525" marT="9525" marB="0" anchor="ctr">
@@ -11531,7 +11040,7 @@
                     <a:p>
                       <a:pPr algn="ctr" fontAlgn="ctr"/>
                       <a:r>
-                        <a:rPr lang="en-US" altLang="ko-KR" sz="800" b="1" i="0" u="none" strike="noStrike" dirty="0" smtClean="0">
+                        <a:rPr lang="en-US" altLang="ko-KR" sz="800" b="1" i="0" u="none" strike="noStrike" dirty="0">
                           <a:solidFill>
                             <a:srgbClr val="000000"/>
                           </a:solidFill>
@@ -11542,7 +11051,7 @@
                         <a:t>AFFECTED</a:t>
                       </a:r>
                       <a:r>
-                        <a:rPr lang="ko-KR" altLang="en-US" sz="800" b="1" i="0" u="none" strike="noStrike" dirty="0" smtClean="0">
+                        <a:rPr lang="ko-KR" altLang="en-US" sz="800" b="1" i="0" u="none" strike="noStrike" dirty="0">
                           <a:solidFill>
                             <a:srgbClr val="000000"/>
                           </a:solidFill>
@@ -11553,7 +11062,7 @@
                         <a:t> </a:t>
                       </a:r>
                       <a:r>
-                        <a:rPr lang="en-US" altLang="ko-KR" sz="800" b="1" i="0" u="none" strike="noStrike" dirty="0" smtClean="0">
+                        <a:rPr lang="en-US" altLang="ko-KR" sz="800" b="1" i="0" u="none" strike="noStrike" dirty="0">
                           <a:solidFill>
                             <a:srgbClr val="000000"/>
                           </a:solidFill>
@@ -11622,7 +11131,7 @@
                     <a:p>
                       <a:pPr algn="ctr" fontAlgn="ctr"/>
                       <a:r>
-                        <a:rPr lang="en-US" sz="800" b="1" i="0" u="none" strike="noStrike" dirty="0" smtClean="0">
+                        <a:rPr lang="en-US" sz="800" b="1" i="0" u="none" strike="noStrike" dirty="0">
                           <a:solidFill>
                             <a:srgbClr val="000000"/>
                           </a:solidFill>
@@ -11630,10 +11139,60 @@
                           <a:latin typeface="+mn-ea"/>
                           <a:ea typeface="+mn-ea"/>
                         </a:rPr>
-                        <a:t>BREAKPOINT </a:t>
-                      </a:r>
-                      <a:r>
-                        <a:rPr lang="en-US" sz="800" b="1" i="0" u="none" strike="noStrike" dirty="0">
+                        <a:t>BREAKPOINT 1</a:t>
+                      </a:r>
+                    </a:p>
+                  </a:txBody>
+                  <a:tcPr marL="9525" marR="9525" marT="9525" marB="0" anchor="ctr">
+                    <a:lnL w="6350" cap="flat" cmpd="sng" algn="ctr">
+                      <a:solidFill>
+                        <a:srgbClr val="000000"/>
+                      </a:solidFill>
+                      <a:prstDash val="solid"/>
+                      <a:round/>
+                      <a:headEnd type="none" w="med" len="med"/>
+                      <a:tailEnd type="none" w="med" len="med"/>
+                    </a:lnL>
+                    <a:lnR w="6350" cap="flat" cmpd="sng" algn="ctr">
+                      <a:solidFill>
+                        <a:srgbClr val="000000"/>
+                      </a:solidFill>
+                      <a:prstDash val="solid"/>
+                      <a:round/>
+                      <a:headEnd type="none" w="med" len="med"/>
+                      <a:tailEnd type="none" w="med" len="med"/>
+                    </a:lnR>
+                    <a:lnT w="6350" cap="flat" cmpd="sng" algn="ctr">
+                      <a:solidFill>
+                        <a:srgbClr val="000000"/>
+                      </a:solidFill>
+                      <a:prstDash val="solid"/>
+                      <a:round/>
+                      <a:headEnd type="none" w="med" len="med"/>
+                      <a:tailEnd type="none" w="med" len="med"/>
+                    </a:lnT>
+                    <a:lnB w="6350" cap="flat" cmpd="sng" algn="ctr">
+                      <a:solidFill>
+                        <a:srgbClr val="000000"/>
+                      </a:solidFill>
+                      <a:prstDash val="solid"/>
+                      <a:round/>
+                      <a:headEnd type="none" w="med" len="med"/>
+                      <a:tailEnd type="none" w="med" len="med"/>
+                    </a:lnB>
+                    <a:solidFill>
+                      <a:srgbClr val="DCE6F1"/>
+                    </a:solidFill>
+                  </a:tcPr>
+                </a:tc>
+                <a:tc>
+                  <a:txBody>
+                    <a:bodyPr/>
+                    <a:lstStyle/>
+                    <a:p>
+                      <a:pPr algn="ctr" fontAlgn="ctr"/>
+                      <a:r>
+                        <a:rPr lang="en-US" altLang="ko-KR" sz="800" b="1" i="0" u="none" strike="noStrike" dirty="0">
                           <a:solidFill>
                             <a:srgbClr val="000000"/>
                           </a:solidFill>
@@ -11641,7 +11200,18 @@
                           <a:latin typeface="+mn-ea"/>
                           <a:ea typeface="+mn-ea"/>
                         </a:rPr>
-                        <a:t>1</a:t>
+                        <a:t>BREAKPOINT</a:t>
+                      </a:r>
+                      <a:r>
+                        <a:rPr lang="en-US" sz="800" b="1" i="0" u="none" strike="noStrike" dirty="0">
+                          <a:solidFill>
+                            <a:srgbClr val="000000"/>
+                          </a:solidFill>
+                          <a:effectLst/>
+                          <a:latin typeface="+mn-ea"/>
+                          <a:ea typeface="+mn-ea"/>
+                        </a:rPr>
+                        <a:t> 2</a:t>
                       </a:r>
                     </a:p>
                   </a:txBody>
@@ -11694,7 +11264,7 @@
                     <a:p>
                       <a:pPr algn="ctr" fontAlgn="ctr"/>
                       <a:r>
-                        <a:rPr lang="en-US" altLang="ko-KR" sz="800" b="1" i="0" u="none" strike="noStrike" dirty="0" smtClean="0">
+                        <a:rPr lang="en-US" sz="800" b="1" i="0" u="none" strike="noStrike" dirty="0">
                           <a:solidFill>
                             <a:srgbClr val="000000"/>
                           </a:solidFill>
@@ -11702,93 +11272,10 @@
                           <a:latin typeface="+mn-ea"/>
                           <a:ea typeface="+mn-ea"/>
                         </a:rPr>
-                        <a:t>BREAKPOINT</a:t>
-                      </a:r>
-                      <a:r>
-                        <a:rPr lang="en-US" sz="800" b="1" i="0" u="none" strike="noStrike" dirty="0" smtClean="0">
-                          <a:solidFill>
-                            <a:srgbClr val="000000"/>
-                          </a:solidFill>
-                          <a:effectLst/>
-                          <a:latin typeface="+mn-ea"/>
-                          <a:ea typeface="+mn-ea"/>
-                        </a:rPr>
-                        <a:t> </a:t>
-                      </a:r>
-                      <a:r>
-                        <a:rPr lang="en-US" sz="800" b="1" i="0" u="none" strike="noStrike" dirty="0">
-                          <a:solidFill>
-                            <a:srgbClr val="000000"/>
-                          </a:solidFill>
-                          <a:effectLst/>
-                          <a:latin typeface="+mn-ea"/>
-                          <a:ea typeface="+mn-ea"/>
-                        </a:rPr>
-                        <a:t>2</a:t>
-                      </a:r>
-                    </a:p>
-                  </a:txBody>
-                  <a:tcPr marL="9525" marR="9525" marT="9525" marB="0" anchor="ctr">
-                    <a:lnL w="6350" cap="flat" cmpd="sng" algn="ctr">
-                      <a:solidFill>
-                        <a:srgbClr val="000000"/>
-                      </a:solidFill>
-                      <a:prstDash val="solid"/>
-                      <a:round/>
-                      <a:headEnd type="none" w="med" len="med"/>
-                      <a:tailEnd type="none" w="med" len="med"/>
-                    </a:lnL>
-                    <a:lnR w="6350" cap="flat" cmpd="sng" algn="ctr">
-                      <a:solidFill>
-                        <a:srgbClr val="000000"/>
-                      </a:solidFill>
-                      <a:prstDash val="solid"/>
-                      <a:round/>
-                      <a:headEnd type="none" w="med" len="med"/>
-                      <a:tailEnd type="none" w="med" len="med"/>
-                    </a:lnR>
-                    <a:lnT w="6350" cap="flat" cmpd="sng" algn="ctr">
-                      <a:solidFill>
-                        <a:srgbClr val="000000"/>
-                      </a:solidFill>
-                      <a:prstDash val="solid"/>
-                      <a:round/>
-                      <a:headEnd type="none" w="med" len="med"/>
-                      <a:tailEnd type="none" w="med" len="med"/>
-                    </a:lnT>
-                    <a:lnB w="6350" cap="flat" cmpd="sng" algn="ctr">
-                      <a:solidFill>
-                        <a:srgbClr val="000000"/>
-                      </a:solidFill>
-                      <a:prstDash val="solid"/>
-                      <a:round/>
-                      <a:headEnd type="none" w="med" len="med"/>
-                      <a:tailEnd type="none" w="med" len="med"/>
-                    </a:lnB>
-                    <a:solidFill>
-                      <a:srgbClr val="DCE6F1"/>
-                    </a:solidFill>
-                  </a:tcPr>
-                </a:tc>
-                <a:tc>
-                  <a:txBody>
-                    <a:bodyPr/>
-                    <a:lstStyle/>
-                    <a:p>
-                      <a:pPr algn="ctr" fontAlgn="ctr"/>
-                      <a:r>
-                        <a:rPr lang="en-US" sz="800" b="1" i="0" u="none" strike="noStrike" dirty="0" smtClean="0">
-                          <a:solidFill>
-                            <a:srgbClr val="000000"/>
-                          </a:solidFill>
-                          <a:effectLst/>
-                          <a:latin typeface="+mn-ea"/>
-                          <a:ea typeface="+mn-ea"/>
-                        </a:rPr>
                         <a:t>SPLICE SUPPORTING</a:t>
                       </a:r>
                       <a:r>
-                        <a:rPr lang="en-US" sz="800" b="1" i="0" u="none" strike="noStrike" baseline="0" dirty="0" smtClean="0">
+                        <a:rPr lang="en-US" sz="800" b="1" i="0" u="none" strike="noStrike" baseline="0" dirty="0">
                           <a:solidFill>
                             <a:srgbClr val="000000"/>
                           </a:solidFill>
@@ -12113,11 +11600,11 @@
           <a:lstStyle/>
           <a:p>
             <a:r>
-              <a:rPr lang="en-US" altLang="ko-KR" sz="1200" b="1" dirty="0" smtClean="0"/>
+              <a:rPr lang="en-US" altLang="ko-KR" sz="1200" b="1" dirty="0"/>
               <a:t>3. Failed gene: </a:t>
             </a:r>
             <a:r>
-              <a:rPr lang="en-US" altLang="ko-KR" sz="1200" dirty="0" smtClean="0"/>
+              <a:rPr lang="en-US" altLang="ko-KR" sz="1200" dirty="0"/>
               <a:t>None</a:t>
             </a:r>
             <a:endParaRPr lang="ko-KR" altLang="en-US" sz="1200" dirty="0"/>
@@ -12146,11 +11633,11 @@
           <a:lstStyle/>
           <a:p>
             <a:r>
-              <a:rPr lang="en-US" altLang="ko-KR" sz="1200" b="1" dirty="0" smtClean="0"/>
+              <a:rPr lang="en-US" altLang="ko-KR" sz="1200" b="1" dirty="0"/>
               <a:t>- Large rearrangements in BRCA1/2</a:t>
             </a:r>
             <a:r>
-              <a:rPr lang="en-US" altLang="ko-KR" sz="1200" dirty="0" smtClean="0"/>
+              <a:rPr lang="en-US" altLang="ko-KR" sz="1200" dirty="0"/>
               <a:t>:</a:t>
             </a:r>
             <a:endParaRPr lang="ko-KR" altLang="en-US" sz="1200" b="1" dirty="0"/>
@@ -12285,7 +11772,7 @@
                     <a:p>
                       <a:pPr algn="ctr" fontAlgn="ctr"/>
                       <a:r>
-                        <a:rPr lang="en-US" sz="800" b="1" i="0" u="none" strike="noStrike" dirty="0" smtClean="0">
+                        <a:rPr lang="en-US" sz="800" b="1" i="0" u="none" strike="noStrike" dirty="0">
                           <a:solidFill>
                             <a:schemeClr val="tx1"/>
                           </a:solidFill>
@@ -12295,14 +11782,6 @@
                         </a:rPr>
                         <a:t>LOCATION</a:t>
                       </a:r>
-                      <a:endParaRPr lang="en-US" sz="800" b="1" i="0" u="none" strike="noStrike" dirty="0">
-                        <a:solidFill>
-                          <a:schemeClr val="tx1"/>
-                        </a:solidFill>
-                        <a:effectLst/>
-                        <a:latin typeface="+mn-ea"/>
-                        <a:ea typeface="+mn-ea"/>
-                      </a:endParaRPr>
                     </a:p>
                   </a:txBody>
                   <a:tcPr marL="5625" marR="5625" marT="5625" marB="0" anchor="ctr">
@@ -12354,7 +11833,7 @@
                     <a:p>
                       <a:pPr algn="ctr" fontAlgn="ctr"/>
                       <a:r>
-                        <a:rPr lang="en-US" sz="800" b="1" i="0" u="none" strike="noStrike" dirty="0" smtClean="0">
+                        <a:rPr lang="en-US" sz="800" b="1" i="0" u="none" strike="noStrike" dirty="0">
                           <a:solidFill>
                             <a:schemeClr val="tx1"/>
                           </a:solidFill>
@@ -12364,14 +11843,6 @@
                         </a:rPr>
                         <a:t>AFFECTED EXON</a:t>
                       </a:r>
-                      <a:endParaRPr lang="en-US" sz="800" b="1" i="0" u="none" strike="noStrike" dirty="0">
-                        <a:solidFill>
-                          <a:schemeClr val="tx1"/>
-                        </a:solidFill>
-                        <a:effectLst/>
-                        <a:latin typeface="+mn-ea"/>
-                        <a:ea typeface="+mn-ea"/>
-                      </a:endParaRPr>
                     </a:p>
                   </a:txBody>
                   <a:tcPr marL="5625" marR="5625" marT="5625" marB="0" anchor="ctr">
@@ -12423,7 +11894,7 @@
                     <a:p>
                       <a:pPr algn="ctr" fontAlgn="ctr"/>
                       <a:r>
-                        <a:rPr lang="en-US" sz="800" b="1" i="0" u="none" strike="noStrike" dirty="0" smtClean="0">
+                        <a:rPr lang="en-US" sz="800" b="1" i="0" u="none" strike="noStrike" dirty="0">
                           <a:solidFill>
                             <a:schemeClr val="tx1"/>
                           </a:solidFill>
@@ -12433,14 +11904,6 @@
                         </a:rPr>
                         <a:t>FOLD CHANGE</a:t>
                       </a:r>
-                      <a:endParaRPr lang="en-US" sz="800" b="1" i="0" u="none" strike="noStrike" dirty="0">
-                        <a:solidFill>
-                          <a:schemeClr val="tx1"/>
-                        </a:solidFill>
-                        <a:effectLst/>
-                        <a:latin typeface="+mn-ea"/>
-                        <a:ea typeface="+mn-ea"/>
-                      </a:endParaRPr>
                     </a:p>
                   </a:txBody>
                   <a:tcPr marL="5625" marR="5625" marT="5625" marB="0" anchor="ctr">
@@ -12492,7 +11955,7 @@
                     <a:p>
                       <a:pPr algn="ctr" fontAlgn="ctr"/>
                       <a:r>
-                        <a:rPr lang="en-US" sz="800" b="1" i="0" u="none" strike="noStrike" dirty="0" smtClean="0">
+                        <a:rPr lang="en-US" sz="800" b="1" i="0" u="none" strike="noStrike" dirty="0">
                           <a:solidFill>
                             <a:schemeClr val="tx1"/>
                           </a:solidFill>
@@ -12502,14 +11965,6 @@
                         </a:rPr>
                         <a:t>ESTIMATED COPY NUMBER</a:t>
                       </a:r>
-                      <a:endParaRPr lang="en-US" sz="800" b="1" i="0" u="none" strike="noStrike" dirty="0">
-                        <a:solidFill>
-                          <a:schemeClr val="tx1"/>
-                        </a:solidFill>
-                        <a:effectLst/>
-                        <a:latin typeface="+mn-ea"/>
-                        <a:ea typeface="+mn-ea"/>
-                      </a:endParaRPr>
                     </a:p>
                   </a:txBody>
                   <a:tcPr marL="5625" marR="5625" marT="5625" marB="0" anchor="ctr">
@@ -12805,13 +12260,6 @@
   <p:clrMapOvr>
     <a:masterClrMapping/>
   </p:clrMapOvr>
-  <p:timing>
-    <p:tnLst>
-      <p:par>
-        <p:cTn id="1" dur="indefinite" restart="never" nodeType="tmRoot"/>
-      </p:par>
-    </p:tnLst>
-  </p:timing>
 </p:sld>
 </file>
 
@@ -12900,15 +12348,15 @@
           <a:lstStyle/>
           <a:p>
             <a:r>
-              <a:rPr lang="en-US" altLang="ko-KR" sz="1200" b="1" dirty="0" smtClean="0"/>
+              <a:rPr lang="en-US" altLang="ko-KR" sz="1200" b="1" dirty="0"/>
               <a:t>▣</a:t>
             </a:r>
             <a:r>
-              <a:rPr lang="ko-KR" altLang="fr-FR" sz="1200" b="1" dirty="0" smtClean="0"/>
+              <a:rPr lang="ko-KR" altLang="fr-FR" sz="1200" b="1" dirty="0"/>
               <a:t> </a:t>
             </a:r>
             <a:r>
-              <a:rPr lang="fr-FR" altLang="ko-KR" sz="1200" b="1" dirty="0" smtClean="0"/>
+              <a:rPr lang="fr-FR" altLang="ko-KR" sz="1200" b="1" dirty="0"/>
               <a:t>Comment</a:t>
             </a:r>
             <a:endParaRPr lang="ko-KR" altLang="en-US" sz="1200" dirty="0"/>
@@ -12943,62 +12391,62 @@
               </a:lnSpc>
             </a:pPr>
             <a:r>
-              <a:rPr lang="en-US" altLang="ko-KR" sz="900" dirty="0" smtClean="0">
+              <a:rPr lang="en-US" altLang="ko-KR" sz="900" dirty="0">
                 <a:latin typeface="+mj-lt"/>
                 <a:ea typeface="굴림" pitchFamily="50" charset="-127"/>
               </a:rPr>
               <a:t>* </a:t>
             </a:r>
             <a:r>
-              <a:rPr lang="ko-KR" altLang="en-US" sz="900" dirty="0" smtClean="0">
+              <a:rPr lang="ko-KR" altLang="en-US" sz="900" dirty="0">
                 <a:latin typeface="+mj-lt"/>
                 <a:ea typeface="굴림" pitchFamily="50" charset="-127"/>
               </a:rPr>
               <a:t>본 검사의 </a:t>
             </a:r>
             <a:r>
-              <a:rPr lang="en-US" altLang="ko-KR" sz="900" dirty="0" smtClean="0">
+              <a:rPr lang="en-US" altLang="ko-KR" sz="900" dirty="0">
                 <a:latin typeface="+mj-lt"/>
                 <a:ea typeface="굴림" pitchFamily="50" charset="-127"/>
               </a:rPr>
               <a:t>raw data (BAM, FASTQ, VCF)</a:t>
             </a:r>
             <a:r>
-              <a:rPr lang="ko-KR" altLang="en-US" sz="900" dirty="0" smtClean="0">
+              <a:rPr lang="ko-KR" altLang="en-US" sz="900" dirty="0">
                 <a:latin typeface="+mj-lt"/>
                 <a:ea typeface="굴림" pitchFamily="50" charset="-127"/>
               </a:rPr>
               <a:t> 파일은 분자 병리 검사실 내 병리과 서버 컴퓨터에서 보관</a:t>
             </a:r>
             <a:r>
-              <a:rPr lang="en-US" altLang="ko-KR" sz="900" dirty="0" smtClean="0">
+              <a:rPr lang="en-US" altLang="ko-KR" sz="900" dirty="0">
                 <a:latin typeface="+mj-lt"/>
                 <a:ea typeface="굴림" pitchFamily="50" charset="-127"/>
               </a:rPr>
               <a:t>, </a:t>
             </a:r>
             <a:r>
-              <a:rPr lang="ko-KR" altLang="en-US" sz="900" dirty="0" smtClean="0">
+              <a:rPr lang="ko-KR" altLang="en-US" sz="900" dirty="0">
                 <a:latin typeface="+mj-lt"/>
                 <a:ea typeface="굴림" pitchFamily="50" charset="-127"/>
               </a:rPr>
               <a:t>관리되고 있습니다</a:t>
             </a:r>
             <a:r>
-              <a:rPr lang="en-US" altLang="ko-KR" sz="900" dirty="0" smtClean="0">
+              <a:rPr lang="en-US" altLang="ko-KR" sz="900" dirty="0">
                 <a:latin typeface="+mj-lt"/>
                 <a:ea typeface="굴림" pitchFamily="50" charset="-127"/>
               </a:rPr>
               <a:t>.</a:t>
             </a:r>
             <a:r>
-              <a:rPr lang="ko-KR" altLang="en-US" sz="900" dirty="0" smtClean="0">
+              <a:rPr lang="ko-KR" altLang="en-US" sz="900" dirty="0">
                 <a:latin typeface="+mj-lt"/>
                 <a:ea typeface="굴림" pitchFamily="50" charset="-127"/>
               </a:rPr>
               <a:t> </a:t>
             </a:r>
-            <a:endParaRPr lang="en-US" altLang="ko-KR" sz="900" dirty="0" smtClean="0">
+            <a:endParaRPr lang="en-US" altLang="ko-KR" sz="900" dirty="0">
               <a:latin typeface="+mj-lt"/>
               <a:ea typeface="굴림" pitchFamily="50" charset="-127"/>
             </a:endParaRPr>
@@ -13010,65 +12458,61 @@
               </a:lnSpc>
             </a:pPr>
             <a:r>
-              <a:rPr lang="en-US" altLang="ko-KR" sz="900" dirty="0" smtClean="0">
+              <a:rPr lang="en-US" altLang="ko-KR" sz="900" dirty="0">
                 <a:latin typeface="+mj-lt"/>
                 <a:ea typeface="굴림" pitchFamily="50" charset="-127"/>
               </a:rPr>
               <a:t>*</a:t>
             </a:r>
             <a:r>
-              <a:rPr lang="ko-KR" altLang="en-US" sz="900" dirty="0" smtClean="0">
+              <a:rPr lang="ko-KR" altLang="en-US" sz="900" dirty="0">
                 <a:latin typeface="+mj-lt"/>
                 <a:ea typeface="굴림" pitchFamily="50" charset="-127"/>
               </a:rPr>
               <a:t> 본 검사의 결과는 </a:t>
             </a:r>
             <a:r>
-              <a:rPr lang="ko-KR" altLang="en-US" sz="900" dirty="0" err="1" smtClean="0">
+              <a:rPr lang="ko-KR" altLang="en-US" sz="900" dirty="0" err="1">
                 <a:latin typeface="+mj-lt"/>
                 <a:ea typeface="굴림" pitchFamily="50" charset="-127"/>
               </a:rPr>
               <a:t>검체에</a:t>
             </a:r>
             <a:r>
-              <a:rPr lang="ko-KR" altLang="en-US" sz="900" dirty="0" smtClean="0">
+              <a:rPr lang="ko-KR" altLang="en-US" sz="900" dirty="0">
                 <a:latin typeface="+mj-lt"/>
                 <a:ea typeface="굴림" pitchFamily="50" charset="-127"/>
               </a:rPr>
               <a:t> 포함된 정상세포와 암세포의 비율에 따라  </a:t>
             </a:r>
             <a:r>
-              <a:rPr lang="ko-KR" altLang="en-US" sz="900" dirty="0" err="1" smtClean="0">
+              <a:rPr lang="ko-KR" altLang="en-US" sz="900" dirty="0" err="1">
                 <a:latin typeface="+mj-lt"/>
                 <a:ea typeface="굴림" pitchFamily="50" charset="-127"/>
               </a:rPr>
               <a:t>위음성의</a:t>
             </a:r>
             <a:r>
-              <a:rPr lang="ko-KR" altLang="en-US" sz="900" dirty="0" smtClean="0">
+              <a:rPr lang="ko-KR" altLang="en-US" sz="900" dirty="0">
                 <a:latin typeface="+mj-lt"/>
                 <a:ea typeface="굴림" pitchFamily="50" charset="-127"/>
               </a:rPr>
               <a:t> 결과를 배제 할 수 없습니다</a:t>
             </a:r>
             <a:r>
-              <a:rPr lang="en-US" altLang="ko-KR" sz="900" dirty="0" smtClean="0">
+              <a:rPr lang="en-US" altLang="ko-KR" sz="900" dirty="0">
                 <a:latin typeface="+mj-lt"/>
                 <a:ea typeface="굴림" pitchFamily="50" charset="-127"/>
               </a:rPr>
               <a:t>.</a:t>
             </a:r>
             <a:r>
-              <a:rPr lang="ko-KR" altLang="en-US" sz="900" dirty="0" smtClean="0">
+              <a:rPr lang="ko-KR" altLang="en-US" sz="900" dirty="0">
                 <a:latin typeface="+mj-lt"/>
                 <a:ea typeface="굴림" pitchFamily="50" charset="-127"/>
               </a:rPr>
               <a:t> </a:t>
             </a:r>
-            <a:endParaRPr lang="ko-KR" altLang="en-US" sz="900" dirty="0">
-              <a:latin typeface="+mj-lt"/>
-              <a:ea typeface="굴림" pitchFamily="50" charset="-127"/>
-            </a:endParaRPr>
           </a:p>
         </p:txBody>
       </p:sp>
@@ -13104,7 +12548,7 @@
                 <a:spcPct val="150000"/>
               </a:lnSpc>
             </a:pPr>
-            <a:endParaRPr lang="en-US" altLang="ko-KR" sz="800" dirty="0" smtClean="0"/>
+            <a:endParaRPr lang="en-US" altLang="ko-KR" sz="800" dirty="0"/>
           </a:p>
           <a:p>
             <a:pPr algn="just">
@@ -13129,7 +12573,7 @@
               </a:lnSpc>
             </a:pPr>
             <a:r>
-              <a:rPr lang="en-US" altLang="ko-KR" sz="800" dirty="0" smtClean="0"/>
+              <a:rPr lang="en-US" altLang="ko-KR" sz="800" dirty="0"/>
               <a:t>*</a:t>
             </a:r>
             <a:r>
@@ -13241,11 +12685,7 @@
             </a:r>
             <a:r>
               <a:rPr lang="it-IT" altLang="ko-KR" sz="800" dirty="0"/>
-              <a:t>J Mol Diagn. 2017; 19(1):4-23</a:t>
-            </a:r>
-            <a:r>
-              <a:rPr lang="it-IT" altLang="ko-KR" sz="800" dirty="0" smtClean="0"/>
-              <a:t>.</a:t>
+              <a:t>J Mol Diagn. 2017; 19(1):4-23.</a:t>
             </a:r>
             <a:endParaRPr lang="ko-KR" altLang="en-US" sz="800" dirty="0"/>
           </a:p>
@@ -13261,13 +12701,6 @@
   <p:clrMapOvr>
     <a:masterClrMapping/>
   </p:clrMapOvr>
-  <p:timing>
-    <p:tnLst>
-      <p:par>
-        <p:cTn id="1" dur="indefinite" restart="never" nodeType="tmRoot"/>
-      </p:par>
-    </p:tnLst>
-  </p:timing>
 </p:sld>
 </file>
 
@@ -13356,7 +12789,7 @@
           <a:lstStyle/>
           <a:p>
             <a:r>
-              <a:rPr lang="en-US" altLang="ko-KR" sz="1200" b="1" dirty="0" smtClean="0"/>
+              <a:rPr lang="en-US" altLang="ko-KR" sz="1200" b="1" dirty="0"/>
               <a:t>▣ Specification</a:t>
             </a:r>
             <a:endParaRPr lang="ko-KR" altLang="en-US" sz="1200" b="1" dirty="0"/>
@@ -13391,37 +12824,37 @@
               </a:lnSpc>
             </a:pPr>
             <a:r>
-              <a:rPr lang="ko-KR" altLang="en-US" sz="1000" b="1" dirty="0" smtClean="0">
+              <a:rPr lang="ko-KR" altLang="en-US" sz="1000" b="1" dirty="0">
                 <a:latin typeface="+mj-lt"/>
               </a:rPr>
               <a:t>검사시약 </a:t>
             </a:r>
             <a:r>
-              <a:rPr lang="en-US" altLang="ko-KR" sz="1000" b="1" dirty="0" smtClean="0">
+              <a:rPr lang="en-US" altLang="ko-KR" sz="1000" b="1" dirty="0">
                 <a:latin typeface="+mj-lt"/>
               </a:rPr>
               <a:t>: </a:t>
             </a:r>
             <a:r>
-              <a:rPr lang="en-US" altLang="ko-KR" sz="1000" dirty="0" err="1" smtClean="0">
+              <a:rPr lang="en-US" altLang="ko-KR" sz="1000" dirty="0" err="1">
                 <a:latin typeface="+mj-lt"/>
               </a:rPr>
               <a:t>AllPrep</a:t>
             </a:r>
             <a:r>
-              <a:rPr lang="en-US" altLang="ko-KR" sz="1000" dirty="0" smtClean="0">
+              <a:rPr lang="en-US" altLang="ko-KR" sz="1000" dirty="0">
                 <a:latin typeface="+mj-lt"/>
               </a:rPr>
               <a:t> DNA/RNA FFPE Kit (50) [</a:t>
             </a:r>
             <a:r>
-              <a:rPr lang="en-US" altLang="ko-KR" sz="1000" dirty="0" err="1" smtClean="0">
+              <a:rPr lang="en-US" altLang="ko-KR" sz="1000" dirty="0" err="1">
                 <a:latin typeface="+mj-lt"/>
               </a:rPr>
               <a:t>Qiagen</a:t>
             </a:r>
             <a:r>
-              <a:rPr lang="en-US" altLang="ko-KR" sz="1000" dirty="0" smtClean="0">
+              <a:rPr lang="en-US" altLang="ko-KR" sz="1000" dirty="0">
                 <a:latin typeface="+mj-lt"/>
               </a:rPr>
               <a:t>], TruSight™ Oncology 500 kit [Illumina]</a:t>
@@ -13434,22 +12867,22 @@
               </a:lnSpc>
             </a:pPr>
             <a:r>
-              <a:rPr lang="ko-KR" altLang="en-US" sz="1000" b="1" dirty="0" smtClean="0">
+              <a:rPr lang="ko-KR" altLang="en-US" sz="1000" b="1" dirty="0">
                 <a:latin typeface="+mj-lt"/>
               </a:rPr>
               <a:t>검사방법 </a:t>
             </a:r>
             <a:r>
-              <a:rPr lang="en-US" altLang="ko-KR" sz="1000" b="1" dirty="0" smtClean="0">
+              <a:rPr lang="en-US" altLang="ko-KR" sz="1000" b="1" dirty="0">
                 <a:latin typeface="+mj-lt"/>
               </a:rPr>
               <a:t>: </a:t>
             </a:r>
             <a:r>
-              <a:rPr lang="en-US" altLang="ko-KR" sz="1000" dirty="0" smtClean="0"/>
+              <a:rPr lang="en-US" altLang="ko-KR" sz="1000" dirty="0"/>
               <a:t>NGS targeted DNA/RNA sequencing (Library : Hybrid capture)</a:t>
             </a:r>
-            <a:endParaRPr lang="en-US" altLang="ko-KR" sz="1000" dirty="0" smtClean="0">
+            <a:endParaRPr lang="en-US" altLang="ko-KR" sz="1000" dirty="0">
               <a:latin typeface="+mj-lt"/>
             </a:endParaRPr>
           </a:p>
@@ -13477,15 +12910,15 @@
           <a:lstStyle/>
           <a:p>
             <a:r>
-              <a:rPr lang="en-US" altLang="ko-KR" sz="1200" b="1" dirty="0" smtClean="0"/>
+              <a:rPr lang="en-US" altLang="ko-KR" sz="1200" b="1" dirty="0"/>
               <a:t>▣ </a:t>
             </a:r>
             <a:r>
-              <a:rPr lang="ko-KR" altLang="en-US" sz="1200" b="1" dirty="0" smtClean="0"/>
+              <a:rPr lang="ko-KR" altLang="en-US" sz="1200" b="1" dirty="0"/>
               <a:t>검사정보</a:t>
             </a:r>
             <a:r>
-              <a:rPr lang="en-US" altLang="ko-KR" sz="1200" b="1" dirty="0" smtClean="0"/>
+              <a:rPr lang="en-US" altLang="ko-KR" sz="1200" b="1" dirty="0"/>
               <a:t> </a:t>
             </a:r>
             <a:endParaRPr lang="ko-KR" altLang="en-US" sz="1200" b="1" dirty="0"/>
@@ -13514,7 +12947,7 @@
           <a:lstStyle/>
           <a:p>
             <a:r>
-              <a:rPr lang="en-US" altLang="ko-KR" sz="1200" b="1" dirty="0" smtClean="0"/>
+              <a:rPr lang="en-US" altLang="ko-KR" sz="1200" b="1" dirty="0"/>
               <a:t>▣ Analysis Program </a:t>
             </a:r>
             <a:endParaRPr lang="ko-KR" altLang="en-US" sz="1200" b="1" dirty="0"/>
@@ -13543,14 +12976,13 @@
           <a:lstStyle/>
           <a:p>
             <a:r>
-              <a:rPr lang="en-US" altLang="ko-KR" sz="1200" b="1" dirty="0" smtClean="0"/>
+              <a:rPr lang="en-US" altLang="ko-KR" sz="1200" b="1" dirty="0"/>
               <a:t>▣ Filter history</a:t>
             </a:r>
             <a:r>
-              <a:rPr lang="ko-KR" altLang="en-US" sz="1200" b="1" dirty="0" smtClean="0"/>
+              <a:rPr lang="ko-KR" altLang="en-US" sz="1200" b="1" dirty="0"/>
               <a:t> </a:t>
             </a:r>
-            <a:endParaRPr lang="ko-KR" altLang="en-US" sz="1200" b="1" dirty="0"/>
           </a:p>
         </p:txBody>
       </p:sp>
@@ -13600,7 +13032,7 @@
               </a:spcAft>
             </a:pPr>
             <a:r>
-              <a:rPr kumimoji="1" lang="en-US" altLang="ko-KR" sz="1000" b="1" i="0" u="none" strike="noStrike" cap="none" normalizeH="0" baseline="0" dirty="0" smtClean="0">
+              <a:rPr kumimoji="1" lang="en-US" altLang="ko-KR" sz="1000" b="1" i="0" u="none" strike="noStrike" cap="none" normalizeH="0" baseline="0" dirty="0">
                 <a:ln>
                   <a:noFill/>
                 </a:ln>
@@ -13615,7 +13047,7 @@
               <a:t>Include :</a:t>
             </a:r>
             <a:r>
-              <a:rPr kumimoji="1" lang="en-US" altLang="ko-KR" sz="1000" b="0" i="0" u="none" strike="noStrike" cap="none" normalizeH="0" baseline="0" dirty="0" smtClean="0">
+              <a:rPr kumimoji="1" lang="en-US" altLang="ko-KR" sz="1000" b="0" i="0" u="none" strike="noStrike" cap="none" normalizeH="0" baseline="0" dirty="0">
                 <a:ln>
                   <a:noFill/>
                 </a:ln>
@@ -13630,7 +13062,7 @@
               <a:t> </a:t>
             </a:r>
             <a:r>
-              <a:rPr kumimoji="1" lang="en-US" altLang="ko-KR" sz="1000" b="0" i="0" u="none" strike="noStrike" cap="none" normalizeH="0" baseline="0" dirty="0" err="1" smtClean="0">
+              <a:rPr kumimoji="1" lang="en-US" altLang="ko-KR" sz="1000" b="0" i="0" u="none" strike="noStrike" cap="none" normalizeH="0" baseline="0" dirty="0" err="1">
                 <a:ln>
                   <a:noFill/>
                 </a:ln>
@@ -13645,7 +13077,7 @@
               <a:t>Exonic</a:t>
             </a:r>
             <a:r>
-              <a:rPr kumimoji="1" lang="en-US" altLang="ko-KR" sz="1000" b="0" i="0" u="none" strike="noStrike" cap="none" normalizeH="0" baseline="0" dirty="0" smtClean="0">
+              <a:rPr kumimoji="1" lang="en-US" altLang="ko-KR" sz="1000" b="0" i="0" u="none" strike="noStrike" cap="none" normalizeH="0" baseline="0" dirty="0">
                 <a:ln>
                   <a:noFill/>
                 </a:ln>
@@ -13660,7 +13092,7 @@
               <a:t>,</a:t>
             </a:r>
             <a:r>
-              <a:rPr kumimoji="1" lang="en-US" altLang="ko-KR" sz="1000" b="0" i="0" u="none" strike="noStrike" cap="none" normalizeH="0" dirty="0" smtClean="0">
+              <a:rPr kumimoji="1" lang="en-US" altLang="ko-KR" sz="1000" b="0" i="0" u="none" strike="noStrike" cap="none" normalizeH="0" dirty="0">
                 <a:ln>
                   <a:noFill/>
                 </a:ln>
@@ -13675,13 +13107,13 @@
               <a:t> Illumina Q.C Filter PASS</a:t>
             </a:r>
             <a:r>
-              <a:rPr kumimoji="1" lang="en-US" altLang="ko-KR" sz="1000" dirty="0" smtClean="0">
+              <a:rPr kumimoji="1" lang="en-US" altLang="ko-KR" sz="1000" dirty="0">
                 <a:ea typeface="맑은 고딕" pitchFamily="50" charset="-127"/>
                 <a:cs typeface="Arial" pitchFamily="34" charset="0"/>
               </a:rPr>
               <a:t>, Fold change &lt;0.5 or &gt;1.5 </a:t>
             </a:r>
-            <a:endParaRPr kumimoji="1" lang="en-US" altLang="ko-KR" sz="1000" b="0" i="0" u="none" strike="noStrike" cap="none" normalizeH="0" baseline="0" dirty="0" smtClean="0">
+            <a:endParaRPr kumimoji="1" lang="en-US" altLang="ko-KR" sz="1000" b="0" i="0" u="none" strike="noStrike" cap="none" normalizeH="0" baseline="0" dirty="0">
               <a:ln>
                 <a:noFill/>
               </a:ln>
@@ -13712,7 +13144,7 @@
               <a:tabLst/>
             </a:pPr>
             <a:r>
-              <a:rPr kumimoji="1" lang="en-US" altLang="ko-KR" sz="1000" b="1" i="0" u="none" strike="noStrike" cap="none" normalizeH="0" baseline="0" dirty="0" smtClean="0">
+              <a:rPr kumimoji="1" lang="en-US" altLang="ko-KR" sz="1000" b="1" i="0" u="none" strike="noStrike" cap="none" normalizeH="0" baseline="0" dirty="0">
                 <a:ln>
                   <a:noFill/>
                 </a:ln>
@@ -13727,7 +13159,7 @@
               <a:t>Exclude :</a:t>
             </a:r>
             <a:r>
-              <a:rPr kumimoji="1" lang="en-US" altLang="ko-KR" sz="1000" b="0" i="0" u="none" strike="noStrike" cap="none" normalizeH="0" baseline="0" dirty="0" smtClean="0">
+              <a:rPr kumimoji="1" lang="en-US" altLang="ko-KR" sz="1000" b="0" i="0" u="none" strike="noStrike" cap="none" normalizeH="0" baseline="0" dirty="0">
                 <a:ln>
                   <a:noFill/>
                 </a:ln>
@@ -13742,7 +13174,7 @@
               <a:t> </a:t>
             </a:r>
             <a:r>
-              <a:rPr kumimoji="1" lang="en-US" altLang="ko-KR" sz="1000" dirty="0" smtClean="0">
+              <a:rPr kumimoji="1" lang="en-US" altLang="ko-KR" sz="1000" dirty="0">
                 <a:solidFill>
                   <a:srgbClr val="000000"/>
                 </a:solidFill>
@@ -13753,7 +13185,7 @@
               <a:t>S</a:t>
             </a:r>
             <a:r>
-              <a:rPr kumimoji="1" lang="en-US" altLang="ko-KR" sz="1000" b="0" i="0" u="none" strike="noStrike" cap="none" normalizeH="0" baseline="0" dirty="0" smtClean="0">
+              <a:rPr kumimoji="1" lang="en-US" altLang="ko-KR" sz="1000" b="0" i="0" u="none" strike="noStrike" cap="none" normalizeH="0" baseline="0" dirty="0">
                 <a:ln>
                   <a:noFill/>
                 </a:ln>
@@ -13767,7 +13199,7 @@
               </a:rPr>
               <a:t>ynonymous, VAF &lt;3%, total depth &lt;100, refer depth=0 </a:t>
             </a:r>
-            <a:endParaRPr kumimoji="1" lang="en-US" altLang="ko-KR" sz="1000" b="0" i="0" u="none" strike="noStrike" cap="none" normalizeH="0" baseline="0" dirty="0" smtClean="0">
+            <a:endParaRPr kumimoji="1" lang="en-US" altLang="ko-KR" sz="1000" b="0" i="0" u="none" strike="noStrike" cap="none" normalizeH="0" baseline="0" dirty="0">
               <a:ln>
                 <a:noFill/>
               </a:ln>
@@ -13804,7 +13236,7 @@
           <a:lstStyle/>
           <a:p>
             <a:r>
-              <a:rPr lang="en-US" altLang="ko-KR" sz="1200" b="1" dirty="0" smtClean="0"/>
+              <a:rPr lang="en-US" altLang="ko-KR" sz="1200" b="1" dirty="0"/>
               <a:t>▣ Q.C</a:t>
             </a:r>
             <a:endParaRPr lang="ko-KR" altLang="en-US" sz="1200" b="1" dirty="0"/>
@@ -13927,27 +13359,27 @@
           </a:lstStyle>
           <a:p>
             <a:r>
-              <a:rPr lang="en-US" altLang="ko-KR" sz="1200" b="1" dirty="0" smtClean="0"/>
+              <a:rPr lang="en-US" altLang="ko-KR" sz="1200" b="1" dirty="0"/>
               <a:t>▣ DNA, RNA </a:t>
             </a:r>
             <a:r>
-              <a:rPr lang="en-US" altLang="ko-KR" sz="700" b="1" dirty="0" smtClean="0"/>
+              <a:rPr lang="en-US" altLang="ko-KR" sz="700" b="1" dirty="0"/>
               <a:t>(</a:t>
             </a:r>
             <a:r>
-              <a:rPr lang="en-US" altLang="ko-KR" sz="700" b="1" dirty="0" err="1" smtClean="0"/>
+              <a:rPr lang="en-US" altLang="ko-KR" sz="700" b="1" dirty="0" err="1"/>
               <a:t>Qubit</a:t>
             </a:r>
             <a:r>
-              <a:rPr lang="en-US" altLang="ko-KR" sz="700" b="1" dirty="0" smtClean="0"/>
+              <a:rPr lang="en-US" altLang="ko-KR" sz="700" b="1" dirty="0"/>
               <a:t> </a:t>
             </a:r>
             <a:r>
-              <a:rPr lang="ko-KR" altLang="en-US" sz="700" b="1" dirty="0" smtClean="0"/>
+              <a:rPr lang="ko-KR" altLang="en-US" sz="700" b="1" dirty="0"/>
               <a:t>농도</a:t>
             </a:r>
             <a:r>
-              <a:rPr lang="en-US" altLang="ko-KR" sz="700" b="1" dirty="0" smtClean="0"/>
+              <a:rPr lang="en-US" altLang="ko-KR" sz="700" b="1" dirty="0"/>
               <a:t>)</a:t>
             </a:r>
             <a:endParaRPr lang="ko-KR" altLang="en-US" sz="700" b="1" dirty="0"/>
@@ -13976,11 +13408,11 @@
           <a:lstStyle/>
           <a:p>
             <a:r>
-              <a:rPr lang="en-US" altLang="ko-KR" sz="1000" dirty="0" smtClean="0"/>
+              <a:rPr lang="en-US" altLang="ko-KR" sz="1000" dirty="0"/>
               <a:t>DRAGEN TSO500</a:t>
             </a:r>
             <a:r>
-              <a:rPr lang="en-US" altLang="ko-KR" sz="1050" dirty="0" smtClean="0"/>
+              <a:rPr lang="en-US" altLang="ko-KR" sz="1050" dirty="0"/>
               <a:t> ( Workflow Version : 2.5.2 )</a:t>
             </a:r>
             <a:endParaRPr lang="ko-KR" altLang="en-US" sz="1050" dirty="0"/>
@@ -14198,7 +13630,7 @@
                     <a:p>
                       <a:pPr algn="ctr" fontAlgn="ctr"/>
                       <a:r>
-                        <a:rPr lang="en-US" sz="1000" b="0" i="0" u="none" strike="noStrike" dirty="0" err="1" smtClean="0">
+                        <a:rPr lang="en-US" sz="1000" b="0" i="0" u="none" strike="noStrike" dirty="0" err="1">
                           <a:solidFill>
                             <a:srgbClr val="000000"/>
                           </a:solidFill>
@@ -14209,7 +13641,18 @@
                         <a:t>NextSeq</a:t>
                       </a:r>
                       <a:r>
-                        <a:rPr lang="en-US" sz="1000" b="0" i="0" u="none" strike="noStrike" dirty="0" smtClean="0">
+                        <a:rPr lang="en-US" sz="1000" b="0" i="0" u="none" strike="noStrike" dirty="0">
+                          <a:solidFill>
+                            <a:srgbClr val="000000"/>
+                          </a:solidFill>
+                          <a:effectLst/>
+                          <a:latin typeface="맑은 고딕" panose="020B0503020000020004" pitchFamily="50" charset="-127"/>
+                          <a:ea typeface="맑은 고딕" panose="020B0503020000020004" pitchFamily="50" charset="-127"/>
+                        </a:rPr>
+                        <a:t> 550Dx  or</a:t>
+                      </a:r>
+                      <a:r>
+                        <a:rPr lang="en-US" sz="1000" b="0" i="0" u="none" strike="noStrike" baseline="0" dirty="0">
                           <a:solidFill>
                             <a:srgbClr val="000000"/>
                           </a:solidFill>
@@ -14220,6 +13663,28 @@
                         <a:t> </a:t>
                       </a:r>
                       <a:r>
+                        <a:rPr lang="en-US" sz="1000" b="0" i="0" u="none" strike="noStrike" baseline="0" dirty="0" err="1">
+                          <a:solidFill>
+                            <a:srgbClr val="000000"/>
+                          </a:solidFill>
+                          <a:effectLst/>
+                          <a:latin typeface="맑은 고딕" panose="020B0503020000020004" pitchFamily="50" charset="-127"/>
+                          <a:ea typeface="맑은 고딕" panose="020B0503020000020004" pitchFamily="50" charset="-127"/>
+                        </a:rPr>
+                        <a:t>NovaSeq</a:t>
+                      </a:r>
+                      <a:r>
+                        <a:rPr lang="en-US" sz="1000" b="0" i="0" u="none" strike="noStrike" baseline="0" dirty="0">
+                          <a:solidFill>
+                            <a:srgbClr val="000000"/>
+                          </a:solidFill>
+                          <a:effectLst/>
+                          <a:latin typeface="맑은 고딕" panose="020B0503020000020004" pitchFamily="50" charset="-127"/>
+                          <a:ea typeface="맑은 고딕" panose="020B0503020000020004" pitchFamily="50" charset="-127"/>
+                        </a:rPr>
+                        <a:t> 6000Dx </a:t>
+                      </a:r>
+                      <a:r>
                         <a:rPr lang="en-US" sz="1000" b="0" i="0" u="none" strike="noStrike" dirty="0">
                           <a:solidFill>
                             <a:srgbClr val="000000"/>
@@ -14228,73 +13693,7 @@
                           <a:latin typeface="맑은 고딕" panose="020B0503020000020004" pitchFamily="50" charset="-127"/>
                           <a:ea typeface="맑은 고딕" panose="020B0503020000020004" pitchFamily="50" charset="-127"/>
                         </a:rPr>
-                        <a:t>550Dx </a:t>
-                      </a:r>
-                      <a:r>
-                        <a:rPr lang="en-US" sz="1000" b="0" i="0" u="none" strike="noStrike" dirty="0" smtClean="0">
-                          <a:solidFill>
-                            <a:srgbClr val="000000"/>
-                          </a:solidFill>
-                          <a:effectLst/>
-                          <a:latin typeface="맑은 고딕" panose="020B0503020000020004" pitchFamily="50" charset="-127"/>
-                          <a:ea typeface="맑은 고딕" panose="020B0503020000020004" pitchFamily="50" charset="-127"/>
-                        </a:rPr>
-                        <a:t> or</a:t>
-                      </a:r>
-                      <a:r>
-                        <a:rPr lang="en-US" sz="1000" b="0" i="0" u="none" strike="noStrike" baseline="0" dirty="0" smtClean="0">
-                          <a:solidFill>
-                            <a:srgbClr val="000000"/>
-                          </a:solidFill>
-                          <a:effectLst/>
-                          <a:latin typeface="맑은 고딕" panose="020B0503020000020004" pitchFamily="50" charset="-127"/>
-                          <a:ea typeface="맑은 고딕" panose="020B0503020000020004" pitchFamily="50" charset="-127"/>
-                        </a:rPr>
-                        <a:t> </a:t>
-                      </a:r>
-                      <a:r>
-                        <a:rPr lang="en-US" sz="1000" b="0" i="0" u="none" strike="noStrike" baseline="0" dirty="0" err="1" smtClean="0">
-                          <a:solidFill>
-                            <a:srgbClr val="000000"/>
-                          </a:solidFill>
-                          <a:effectLst/>
-                          <a:latin typeface="맑은 고딕" panose="020B0503020000020004" pitchFamily="50" charset="-127"/>
-                          <a:ea typeface="맑은 고딕" panose="020B0503020000020004" pitchFamily="50" charset="-127"/>
-                        </a:rPr>
-                        <a:t>NovaSeq</a:t>
-                      </a:r>
-                      <a:r>
-                        <a:rPr lang="en-US" sz="1000" b="0" i="0" u="none" strike="noStrike" baseline="0" dirty="0" smtClean="0">
-                          <a:solidFill>
-                            <a:srgbClr val="000000"/>
-                          </a:solidFill>
-                          <a:effectLst/>
-                          <a:latin typeface="맑은 고딕" panose="020B0503020000020004" pitchFamily="50" charset="-127"/>
-                          <a:ea typeface="맑은 고딕" panose="020B0503020000020004" pitchFamily="50" charset="-127"/>
-                        </a:rPr>
-                        <a:t> 6000Dx </a:t>
-                      </a:r>
-                      <a:r>
-                        <a:rPr lang="en-US" sz="1000" b="0" i="0" u="none" strike="noStrike" dirty="0" smtClean="0">
-                          <a:solidFill>
-                            <a:srgbClr val="000000"/>
-                          </a:solidFill>
-                          <a:effectLst/>
-                          <a:latin typeface="맑은 고딕" panose="020B0503020000020004" pitchFamily="50" charset="-127"/>
-                          <a:ea typeface="맑은 고딕" panose="020B0503020000020004" pitchFamily="50" charset="-127"/>
-                        </a:rPr>
-                        <a:t>(research </a:t>
-                      </a:r>
-                      <a:r>
-                        <a:rPr lang="en-US" sz="1000" b="0" i="0" u="none" strike="noStrike" dirty="0">
-                          <a:solidFill>
-                            <a:srgbClr val="000000"/>
-                          </a:solidFill>
-                          <a:effectLst/>
-                          <a:latin typeface="맑은 고딕" panose="020B0503020000020004" pitchFamily="50" charset="-127"/>
-                          <a:ea typeface="맑은 고딕" panose="020B0503020000020004" pitchFamily="50" charset="-127"/>
-                        </a:rPr>
-                        <a:t>mode)</a:t>
+                        <a:t>(research mode)</a:t>
                       </a:r>
                     </a:p>
                   </a:txBody>
@@ -15252,17 +14651,6 @@
                     <a:p>
                       <a:pPr algn="ctr" fontAlgn="ctr"/>
                       <a:r>
-                        <a:rPr lang="en-US" sz="1000" b="0" i="0" u="none" strike="noStrike" dirty="0" smtClean="0">
-                          <a:solidFill>
-                            <a:srgbClr val="000000"/>
-                          </a:solidFill>
-                          <a:effectLst/>
-                          <a:latin typeface="맑은 고딕" panose="020B0503020000020004" pitchFamily="50" charset="-127"/>
-                          <a:ea typeface="맑은 고딕" panose="020B0503020000020004" pitchFamily="50" charset="-127"/>
-                        </a:rPr>
-                        <a:t>8 or 16 or 32 </a:t>
-                      </a:r>
-                      <a:r>
                         <a:rPr lang="en-US" sz="1000" b="0" i="0" u="none" strike="noStrike" dirty="0">
                           <a:solidFill>
                             <a:srgbClr val="000000"/>
@@ -15271,7 +14659,7 @@
                           <a:latin typeface="맑은 고딕" panose="020B0503020000020004" pitchFamily="50" charset="-127"/>
                           <a:ea typeface="맑은 고딕" panose="020B0503020000020004" pitchFamily="50" charset="-127"/>
                         </a:rPr>
-                        <a:t>samples per run</a:t>
+                        <a:t>8 or 16 or 32 samples per run</a:t>
                       </a:r>
                     </a:p>
                   </a:txBody>
@@ -15700,19 +15088,19 @@
               </a:lnSpc>
             </a:pPr>
             <a:r>
-              <a:rPr lang="en-US" altLang="ko-KR" sz="1000" b="1" dirty="0" smtClean="0">
+              <a:rPr lang="en-US" altLang="ko-KR" sz="1000" b="1" dirty="0">
                 <a:latin typeface="+mj-lt"/>
               </a:rPr>
               <a:t>Reference genome : </a:t>
             </a:r>
             <a:r>
-              <a:rPr lang="en-US" altLang="ko-KR" sz="1000" dirty="0" err="1" smtClean="0">
+              <a:rPr lang="en-US" altLang="ko-KR" sz="1000" dirty="0" err="1">
                 <a:latin typeface="+mj-lt"/>
               </a:rPr>
               <a:t>Homo_sapiens</a:t>
             </a:r>
             <a:r>
-              <a:rPr lang="en-US" altLang="ko-KR" sz="1000" dirty="0" smtClean="0">
+              <a:rPr lang="en-US" altLang="ko-KR" sz="1000" dirty="0">
                 <a:latin typeface="+mj-lt"/>
               </a:rPr>
               <a:t>/ UCSC/ hg19 </a:t>
@@ -15761,16 +15149,12 @@
               <a:t>) : </a:t>
             </a:r>
             <a:r>
-              <a:rPr lang="en-US" dirty="0" smtClean="0"/>
+              <a:rPr lang="en-US" dirty="0"/>
               <a:t>                    </a:t>
             </a:r>
             <a:r>
-              <a:rPr dirty="0" smtClean="0"/>
-              <a:t>RNA </a:t>
-            </a:r>
-            <a:r>
               <a:rPr dirty="0"/>
-              <a:t>(ng/</a:t>
+              <a:t>RNA (ng/</a:t>
             </a:r>
             <a:r>
               <a:rPr dirty="0" err="1"/>
@@ -15778,13 +15162,8 @@
             </a:r>
             <a:r>
               <a:rPr dirty="0"/>
-              <a:t>) </a:t>
+              <a:t>) :</a:t>
             </a:r>
-            <a:r>
-              <a:rPr dirty="0" smtClean="0"/>
-              <a:t>:</a:t>
-            </a:r>
-            <a:endParaRPr dirty="0"/>
           </a:p>
         </p:txBody>
       </p:sp>
@@ -16599,10 +15978,9 @@
               <a:t>검사기기</a:t>
             </a:r>
             <a:r>
-              <a:rPr b="0" dirty="0" smtClean="0"/>
+              <a:rPr b="0" dirty="0"/>
               <a:t>:</a:t>
             </a:r>
-            <a:endParaRPr b="0" dirty="0"/>
           </a:p>
         </p:txBody>
       </p:sp>
@@ -16611,13 +15989,6 @@
   <p:clrMapOvr>
     <a:masterClrMapping/>
   </p:clrMapOvr>
-  <p:timing>
-    <p:tnLst>
-      <p:par>
-        <p:cTn id="1" dur="indefinite" restart="never" nodeType="tmRoot"/>
-      </p:par>
-    </p:tnLst>
-  </p:timing>
 </p:sld>
 </file>
 
@@ -16739,7 +16110,7 @@
           <a:lstStyle/>
           <a:p>
             <a:r>
-              <a:rPr lang="en-US" altLang="ko-KR" dirty="0" smtClean="0"/>
+              <a:rPr lang="en-US" altLang="ko-KR" dirty="0"/>
               <a:t>--------------------------------------------------------------------</a:t>
             </a:r>
             <a:endParaRPr lang="ko-KR" altLang="en-US" dirty="0"/>
@@ -16768,11 +16139,11 @@
           <a:lstStyle/>
           <a:p>
             <a:r>
-              <a:rPr lang="en-US" altLang="ko-KR" sz="1200" b="1" dirty="0" smtClean="0"/>
+              <a:rPr lang="en-US" altLang="ko-KR" sz="1200" b="1" dirty="0"/>
               <a:t>▣ </a:t>
             </a:r>
             <a:r>
-              <a:rPr lang="en-US" altLang="ko-KR" sz="1200" b="1" dirty="0" smtClean="0">
+              <a:rPr lang="en-US" altLang="ko-KR" sz="1200" b="1" dirty="0">
                 <a:latin typeface="+mn-ea"/>
               </a:rPr>
               <a:t>Gene Content in the TruSight Oncology 500 panel Assay </a:t>
@@ -16900,51 +16271,47 @@
           </a:lstStyle>
           <a:p>
             <a:r>
-              <a:rPr lang="ko-KR" altLang="en-US" sz="700" dirty="0" smtClean="0"/>
+              <a:rPr lang="ko-KR" altLang="en-US" sz="700" dirty="0"/>
               <a:t>검사기관 </a:t>
             </a:r>
             <a:r>
-              <a:rPr lang="en-US" altLang="ko-KR" sz="700" dirty="0" smtClean="0"/>
+              <a:rPr lang="en-US" altLang="ko-KR" sz="700" dirty="0"/>
               <a:t>: </a:t>
             </a:r>
             <a:r>
-              <a:rPr lang="ko-KR" altLang="en-US" sz="700" dirty="0" err="1" smtClean="0"/>
+              <a:rPr lang="ko-KR" altLang="en-US" sz="700" dirty="0" err="1"/>
               <a:t>세브란스병원</a:t>
             </a:r>
             <a:r>
-              <a:rPr lang="ko-KR" altLang="en-US" sz="700" dirty="0" smtClean="0"/>
+              <a:rPr lang="ko-KR" altLang="en-US" sz="700" dirty="0"/>
               <a:t> 병리과 분자병리 검사실</a:t>
             </a:r>
-            <a:endParaRPr lang="en-US" altLang="ko-KR" sz="700" dirty="0" smtClean="0"/>
+            <a:endParaRPr lang="en-US" altLang="ko-KR" sz="700" dirty="0"/>
           </a:p>
           <a:p>
             <a:r>
-              <a:rPr lang="ko-KR" altLang="en-US" sz="700" dirty="0" smtClean="0"/>
+              <a:rPr lang="ko-KR" altLang="en-US" sz="700" dirty="0"/>
               <a:t>서울시 서대문구 연세로 </a:t>
             </a:r>
             <a:r>
-              <a:rPr lang="en-US" altLang="ko-KR" sz="700" dirty="0" smtClean="0"/>
+              <a:rPr lang="en-US" altLang="ko-KR" sz="700" dirty="0"/>
               <a:t>50-1 (</a:t>
             </a:r>
             <a:r>
-              <a:rPr lang="ko-KR" altLang="en-US" sz="700" dirty="0" smtClean="0"/>
+              <a:rPr lang="ko-KR" altLang="en-US" sz="700" dirty="0"/>
               <a:t>신촌동 </a:t>
             </a:r>
             <a:r>
-              <a:rPr lang="en-US" altLang="ko-KR" sz="700" dirty="0" smtClean="0"/>
+              <a:rPr lang="en-US" altLang="ko-KR" sz="700" dirty="0"/>
               <a:t>134) </a:t>
             </a:r>
             <a:r>
-              <a:rPr lang="ko-KR" altLang="en-US" sz="700" dirty="0" smtClean="0"/>
+              <a:rPr lang="ko-KR" altLang="en-US" sz="700" dirty="0"/>
               <a:t>세브란스병원 병리과</a:t>
             </a:r>
             <a:r>
               <a:rPr lang="en-US" altLang="ko-KR" sz="700" dirty="0"/>
-              <a:t> </a:t>
-            </a:r>
-            <a:r>
-              <a:rPr lang="en-US" altLang="ko-KR" sz="700" dirty="0" smtClean="0"/>
-              <a:t>Tel: 02-2228-2625</a:t>
+              <a:t> Tel: 02-2228-2625</a:t>
             </a:r>
             <a:endParaRPr lang="ko-KR" altLang="en-US" sz="700" dirty="0"/>
           </a:p>
@@ -39479,10 +38846,9 @@
               <a:t>Tested by</a:t>
             </a:r>
             <a:r>
-              <a:rPr b="0" dirty="0" smtClean="0"/>
+              <a:rPr b="0" dirty="0"/>
               <a:t>:</a:t>
             </a:r>
-            <a:endParaRPr b="0" dirty="0"/>
           </a:p>
         </p:txBody>
       </p:sp>
@@ -39729,13 +39095,6 @@
   <p:clrMapOvr>
     <a:masterClrMapping/>
   </p:clrMapOvr>
-  <p:timing>
-    <p:tnLst>
-      <p:par>
-        <p:cTn id="1" dur="indefinite" restart="never" nodeType="tmRoot"/>
-      </p:par>
-    </p:tnLst>
-  </p:timing>
 </p:sld>
 </file>
 

</xml_diff>

<commit_message>
feat: implement footer info and fix formatting
</commit_message>
<xml_diff>
--- a/resources/blank_GE_report.pptx
+++ b/resources/blank_GE_report.pptx
@@ -213,7 +213,7 @@
             <a:fld id="{B0AF433D-ACB8-475A-9DBB-3D1EBDB4B826}" type="datetimeFigureOut">
               <a:rPr lang="ko-KR" altLang="en-US" smtClean="0"/>
               <a:pPr/>
-              <a:t>2026. 1. 26.</a:t>
+              <a:t>2026. 2. 3.</a:t>
             </a:fld>
             <a:endParaRPr lang="ko-KR" altLang="en-US"/>
           </a:p>
@@ -748,7 +748,7 @@
             <a:fld id="{6DD992CD-CDBB-40CF-A1EE-0B1B8B43A805}" type="datetimeFigureOut">
               <a:rPr lang="ko-KR" altLang="en-US" smtClean="0"/>
               <a:pPr/>
-              <a:t>2026. 1. 26.</a:t>
+              <a:t>2026. 2. 3.</a:t>
             </a:fld>
             <a:endParaRPr lang="ko-KR" altLang="en-US"/>
           </a:p>
@@ -913,7 +913,7 @@
             <a:fld id="{6DD992CD-CDBB-40CF-A1EE-0B1B8B43A805}" type="datetimeFigureOut">
               <a:rPr lang="ko-KR" altLang="en-US" smtClean="0"/>
               <a:pPr/>
-              <a:t>2026. 1. 26.</a:t>
+              <a:t>2026. 2. 3.</a:t>
             </a:fld>
             <a:endParaRPr lang="ko-KR" altLang="en-US"/>
           </a:p>
@@ -1088,7 +1088,7 @@
             <a:fld id="{6DD992CD-CDBB-40CF-A1EE-0B1B8B43A805}" type="datetimeFigureOut">
               <a:rPr lang="ko-KR" altLang="en-US" smtClean="0"/>
               <a:pPr/>
-              <a:t>2026. 1. 26.</a:t>
+              <a:t>2026. 2. 3.</a:t>
             </a:fld>
             <a:endParaRPr lang="ko-KR" altLang="en-US"/>
           </a:p>
@@ -1253,7 +1253,7 @@
             <a:fld id="{6DD992CD-CDBB-40CF-A1EE-0B1B8B43A805}" type="datetimeFigureOut">
               <a:rPr lang="ko-KR" altLang="en-US" smtClean="0"/>
               <a:pPr/>
-              <a:t>2026. 1. 26.</a:t>
+              <a:t>2026. 2. 3.</a:t>
             </a:fld>
             <a:endParaRPr lang="ko-KR" altLang="en-US"/>
           </a:p>
@@ -1495,7 +1495,7 @@
             <a:fld id="{6DD992CD-CDBB-40CF-A1EE-0B1B8B43A805}" type="datetimeFigureOut">
               <a:rPr lang="ko-KR" altLang="en-US" smtClean="0"/>
               <a:pPr/>
-              <a:t>2026. 1. 26.</a:t>
+              <a:t>2026. 2. 3.</a:t>
             </a:fld>
             <a:endParaRPr lang="ko-KR" altLang="en-US"/>
           </a:p>
@@ -1777,7 +1777,7 @@
             <a:fld id="{6DD992CD-CDBB-40CF-A1EE-0B1B8B43A805}" type="datetimeFigureOut">
               <a:rPr lang="ko-KR" altLang="en-US" smtClean="0"/>
               <a:pPr/>
-              <a:t>2026. 1. 26.</a:t>
+              <a:t>2026. 2. 3.</a:t>
             </a:fld>
             <a:endParaRPr lang="ko-KR" altLang="en-US"/>
           </a:p>
@@ -2198,7 +2198,7 @@
             <a:fld id="{6DD992CD-CDBB-40CF-A1EE-0B1B8B43A805}" type="datetimeFigureOut">
               <a:rPr lang="ko-KR" altLang="en-US" smtClean="0"/>
               <a:pPr/>
-              <a:t>2026. 1. 26.</a:t>
+              <a:t>2026. 2. 3.</a:t>
             </a:fld>
             <a:endParaRPr lang="ko-KR" altLang="en-US"/>
           </a:p>
@@ -2312,7 +2312,7 @@
             <a:fld id="{6DD992CD-CDBB-40CF-A1EE-0B1B8B43A805}" type="datetimeFigureOut">
               <a:rPr lang="ko-KR" altLang="en-US" smtClean="0"/>
               <a:pPr/>
-              <a:t>2026. 1. 26.</a:t>
+              <a:t>2026. 2. 3.</a:t>
             </a:fld>
             <a:endParaRPr lang="ko-KR" altLang="en-US"/>
           </a:p>
@@ -2404,7 +2404,7 @@
             <a:fld id="{6DD992CD-CDBB-40CF-A1EE-0B1B8B43A805}" type="datetimeFigureOut">
               <a:rPr lang="ko-KR" altLang="en-US" smtClean="0"/>
               <a:pPr/>
-              <a:t>2026. 1. 26.</a:t>
+              <a:t>2026. 2. 3.</a:t>
             </a:fld>
             <a:endParaRPr lang="ko-KR" altLang="en-US"/>
           </a:p>
@@ -2676,7 +2676,7 @@
             <a:fld id="{6DD992CD-CDBB-40CF-A1EE-0B1B8B43A805}" type="datetimeFigureOut">
               <a:rPr lang="ko-KR" altLang="en-US" smtClean="0"/>
               <a:pPr/>
-              <a:t>2026. 1. 26.</a:t>
+              <a:t>2026. 2. 3.</a:t>
             </a:fld>
             <a:endParaRPr lang="ko-KR" altLang="en-US"/>
           </a:p>
@@ -2925,7 +2925,7 @@
             <a:fld id="{6DD992CD-CDBB-40CF-A1EE-0B1B8B43A805}" type="datetimeFigureOut">
               <a:rPr lang="ko-KR" altLang="en-US" smtClean="0"/>
               <a:pPr/>
-              <a:t>2026. 1. 26.</a:t>
+              <a:t>2026. 2. 3.</a:t>
             </a:fld>
             <a:endParaRPr lang="ko-KR" altLang="en-US"/>
           </a:p>
@@ -3133,7 +3133,7 @@
             <a:fld id="{6DD992CD-CDBB-40CF-A1EE-0B1B8B43A805}" type="datetimeFigureOut">
               <a:rPr lang="ko-KR" altLang="en-US" smtClean="0"/>
               <a:pPr/>
-              <a:t>2026. 1. 26.</a:t>
+              <a:t>2026. 2. 3.</a:t>
             </a:fld>
             <a:endParaRPr lang="ko-KR" altLang="en-US"/>
           </a:p>
@@ -38861,7 +38861,7 @@
         <p:spPr>
           <a:xfrm>
             <a:off x="2570400" y="8100000"/>
-            <a:ext cx="2015999" cy="277200"/>
+            <a:ext cx="1114408" cy="276999"/>
           </a:xfrm>
           <a:prstGeom prst="rect">
             <a:avLst/>
@@ -38883,7 +38883,7 @@
             </a:r>
             <a:r>
               <a:rPr b="0" dirty="0"/>
-              <a:t>: 이청</a:t>
+              <a:t>:</a:t>
             </a:r>
           </a:p>
         </p:txBody>
@@ -38897,7 +38897,7 @@
         <p:spPr>
           <a:xfrm>
             <a:off x="190800" y="8380800"/>
-            <a:ext cx="2015999" cy="277200"/>
+            <a:ext cx="949299" cy="276999"/>
           </a:xfrm>
           <a:prstGeom prst="rect">
             <a:avLst/>
@@ -38914,11 +38914,12 @@
               <a:defRPr sz="1200" b="1"/>
             </a:pPr>
             <a:r>
+              <a:rPr dirty="0"/>
               <a:t>Signed by</a:t>
             </a:r>
             <a:r>
-              <a:rPr b="0"/>
-              <a:t>:              </a:t>
+              <a:rPr b="0" dirty="0"/>
+              <a:t>:</a:t>
             </a:r>
           </a:p>
         </p:txBody>

</xml_diff>